<commit_message>
added some stuff to doku and presentation
</commit_message>
<xml_diff>
--- a/Praesentation.pptx
+++ b/Praesentation.pptx
@@ -8,12 +8,13 @@
     <p:sldId id="256" r:id="rId2"/>
     <p:sldId id="257" r:id="rId3"/>
     <p:sldId id="259" r:id="rId4"/>
-    <p:sldId id="260" r:id="rId5"/>
-    <p:sldId id="258" r:id="rId6"/>
-    <p:sldId id="266" r:id="rId7"/>
-    <p:sldId id="263" r:id="rId8"/>
-    <p:sldId id="264" r:id="rId9"/>
-    <p:sldId id="265" r:id="rId10"/>
+    <p:sldId id="258" r:id="rId5"/>
+    <p:sldId id="260" r:id="rId6"/>
+    <p:sldId id="267" r:id="rId7"/>
+    <p:sldId id="266" r:id="rId8"/>
+    <p:sldId id="263" r:id="rId9"/>
+    <p:sldId id="264" r:id="rId10"/>
+    <p:sldId id="265" r:id="rId11"/>
   </p:sldIdLst>
   <p:sldSz cx="12192000" cy="6858000"/>
   <p:notesSz cx="6858000" cy="9144000"/>
@@ -112,6 +113,11 @@
       </a:defRPr>
     </a:lvl9pPr>
   </p:defaultTextStyle>
+  <p:extLst>
+    <p:ext uri="{EFAFB233-063F-42B5-8137-9DF3F51BA10A}">
+      <p15:sldGuideLst xmlns:p15="http://schemas.microsoft.com/office/powerpoint/2012/main"/>
+    </p:ext>
+  </p:extLst>
 </p:presentation>
 </file>
 
@@ -245,7 +251,7 @@
           </a:lstStyle>
           <a:p>
             <a:r>
-              <a:rPr lang="de-DE" smtClean="0"/>
+              <a:rPr lang="de-DE"/>
               <a:t>Titelmasterformat durch Klicken bearbeiten</a:t>
             </a:r>
             <a:endParaRPr lang="en-US" dirty="0"/>
@@ -317,7 +323,7 @@
           </a:lstStyle>
           <a:p>
             <a:r>
-              <a:rPr lang="de-DE" smtClean="0"/>
+              <a:rPr lang="de-DE"/>
               <a:t>Formatvorlage des Untertitelmasters durch Klicken bearbeiten</a:t>
             </a:r>
             <a:endParaRPr lang="en-US" dirty="0"/>
@@ -341,9 +347,9 @@
           <a:p>
             <a:fld id="{49C59592-045F-4046-8645-2085C4B816F7}" type="datetimeFigureOut">
               <a:rPr lang="de-DE" smtClean="0"/>
-              <a:t>03.06.2019</a:t>
+              <a:t>04.06.2019</a:t>
             </a:fld>
-            <a:endParaRPr lang="de-DE"/>
+            <a:endParaRPr lang="de-DE" dirty="0"/>
           </a:p>
         </p:txBody>
       </p:sp>
@@ -362,7 +368,7 @@
           <a:bodyPr/>
           <a:lstStyle/>
           <a:p>
-            <a:endParaRPr lang="de-DE"/>
+            <a:endParaRPr lang="de-DE" dirty="0"/>
           </a:p>
         </p:txBody>
       </p:sp>
@@ -383,9 +389,9 @@
           <a:p>
             <a:fld id="{2C26B24D-DB5E-4E92-A315-6B2CE60C0022}" type="slidenum">
               <a:rPr lang="de-DE" smtClean="0"/>
-              <a:t>‹Nr.›</a:t>
+              <a:t>‹#›</a:t>
             </a:fld>
-            <a:endParaRPr lang="de-DE"/>
+            <a:endParaRPr lang="de-DE" dirty="0"/>
           </a:p>
         </p:txBody>
       </p:sp>
@@ -473,7 +479,7 @@
           <a:lstStyle/>
           <a:p>
             <a:r>
-              <a:rPr lang="de-DE" smtClean="0"/>
+              <a:rPr lang="de-DE"/>
               <a:t>Titelmasterformat durch Klicken bearbeiten</a:t>
             </a:r>
             <a:endParaRPr lang="en-US" dirty="0"/>
@@ -497,35 +503,35 @@
           <a:p>
             <a:pPr lvl="0"/>
             <a:r>
-              <a:rPr lang="de-DE" smtClean="0"/>
+              <a:rPr lang="de-DE"/>
               <a:t>Textmasterformat bearbeiten</a:t>
             </a:r>
           </a:p>
           <a:p>
             <a:pPr lvl="1"/>
             <a:r>
-              <a:rPr lang="de-DE" smtClean="0"/>
+              <a:rPr lang="de-DE"/>
               <a:t>Zweite Ebene</a:t>
             </a:r>
           </a:p>
           <a:p>
             <a:pPr lvl="2"/>
             <a:r>
-              <a:rPr lang="de-DE" smtClean="0"/>
+              <a:rPr lang="de-DE"/>
               <a:t>Dritte Ebene</a:t>
             </a:r>
           </a:p>
           <a:p>
             <a:pPr lvl="3"/>
             <a:r>
-              <a:rPr lang="de-DE" smtClean="0"/>
+              <a:rPr lang="de-DE"/>
               <a:t>Vierte Ebene</a:t>
             </a:r>
           </a:p>
           <a:p>
             <a:pPr lvl="4"/>
             <a:r>
-              <a:rPr lang="de-DE" smtClean="0"/>
+              <a:rPr lang="de-DE"/>
               <a:t>Fünfte Ebene</a:t>
             </a:r>
             <a:endParaRPr lang="en-US" dirty="0"/>
@@ -549,9 +555,9 @@
           <a:p>
             <a:fld id="{49C59592-045F-4046-8645-2085C4B816F7}" type="datetimeFigureOut">
               <a:rPr lang="de-DE" smtClean="0"/>
-              <a:t>03.06.2019</a:t>
+              <a:t>04.06.2019</a:t>
             </a:fld>
-            <a:endParaRPr lang="de-DE"/>
+            <a:endParaRPr lang="de-DE" dirty="0"/>
           </a:p>
         </p:txBody>
       </p:sp>
@@ -570,7 +576,7 @@
           <a:bodyPr/>
           <a:lstStyle/>
           <a:p>
-            <a:endParaRPr lang="de-DE"/>
+            <a:endParaRPr lang="de-DE" dirty="0"/>
           </a:p>
         </p:txBody>
       </p:sp>
@@ -591,9 +597,9 @@
           <a:p>
             <a:fld id="{2C26B24D-DB5E-4E92-A315-6B2CE60C0022}" type="slidenum">
               <a:rPr lang="de-DE" smtClean="0"/>
-              <a:t>‹Nr.›</a:t>
+              <a:t>‹#›</a:t>
             </a:fld>
-            <a:endParaRPr lang="de-DE"/>
+            <a:endParaRPr lang="de-DE" dirty="0"/>
           </a:p>
         </p:txBody>
       </p:sp>
@@ -724,7 +730,7 @@
           <a:lstStyle/>
           <a:p>
             <a:r>
-              <a:rPr lang="de-DE" smtClean="0"/>
+              <a:rPr lang="de-DE"/>
               <a:t>Titelmasterformat durch Klicken bearbeiten</a:t>
             </a:r>
             <a:endParaRPr lang="en-US" dirty="0"/>
@@ -753,35 +759,35 @@
           <a:p>
             <a:pPr lvl="0"/>
             <a:r>
-              <a:rPr lang="de-DE" smtClean="0"/>
+              <a:rPr lang="de-DE"/>
               <a:t>Textmasterformat bearbeiten</a:t>
             </a:r>
           </a:p>
           <a:p>
             <a:pPr lvl="1"/>
             <a:r>
-              <a:rPr lang="de-DE" smtClean="0"/>
+              <a:rPr lang="de-DE"/>
               <a:t>Zweite Ebene</a:t>
             </a:r>
           </a:p>
           <a:p>
             <a:pPr lvl="2"/>
             <a:r>
-              <a:rPr lang="de-DE" smtClean="0"/>
+              <a:rPr lang="de-DE"/>
               <a:t>Dritte Ebene</a:t>
             </a:r>
           </a:p>
           <a:p>
             <a:pPr lvl="3"/>
             <a:r>
-              <a:rPr lang="de-DE" smtClean="0"/>
+              <a:rPr lang="de-DE"/>
               <a:t>Vierte Ebene</a:t>
             </a:r>
           </a:p>
           <a:p>
             <a:pPr lvl="4"/>
             <a:r>
-              <a:rPr lang="de-DE" smtClean="0"/>
+              <a:rPr lang="de-DE"/>
               <a:t>Fünfte Ebene</a:t>
             </a:r>
             <a:endParaRPr lang="en-US" dirty="0"/>
@@ -805,9 +811,9 @@
           <a:p>
             <a:fld id="{49C59592-045F-4046-8645-2085C4B816F7}" type="datetimeFigureOut">
               <a:rPr lang="de-DE" smtClean="0"/>
-              <a:t>03.06.2019</a:t>
+              <a:t>04.06.2019</a:t>
             </a:fld>
-            <a:endParaRPr lang="de-DE"/>
+            <a:endParaRPr lang="de-DE" dirty="0"/>
           </a:p>
         </p:txBody>
       </p:sp>
@@ -826,7 +832,7 @@
           <a:bodyPr/>
           <a:lstStyle/>
           <a:p>
-            <a:endParaRPr lang="de-DE"/>
+            <a:endParaRPr lang="de-DE" dirty="0"/>
           </a:p>
         </p:txBody>
       </p:sp>
@@ -847,9 +853,9 @@
           <a:p>
             <a:fld id="{2C26B24D-DB5E-4E92-A315-6B2CE60C0022}" type="slidenum">
               <a:rPr lang="de-DE" smtClean="0"/>
-              <a:t>‹Nr.›</a:t>
+              <a:t>‹#›</a:t>
             </a:fld>
-            <a:endParaRPr lang="de-DE"/>
+            <a:endParaRPr lang="de-DE" dirty="0"/>
           </a:p>
         </p:txBody>
       </p:sp>
@@ -903,7 +909,7 @@
           </a:lstStyle>
           <a:p>
             <a:r>
-              <a:rPr lang="de-DE" smtClean="0"/>
+              <a:rPr lang="de-DE"/>
               <a:t>Titelmasterformat durch Klicken bearbeiten</a:t>
             </a:r>
             <a:endParaRPr lang="en-US" dirty="0"/>
@@ -927,35 +933,35 @@
           <a:p>
             <a:pPr lvl="0"/>
             <a:r>
-              <a:rPr lang="de-DE" smtClean="0"/>
+              <a:rPr lang="de-DE"/>
               <a:t>Textmasterformat bearbeiten</a:t>
             </a:r>
           </a:p>
           <a:p>
             <a:pPr lvl="1"/>
             <a:r>
-              <a:rPr lang="de-DE" smtClean="0"/>
+              <a:rPr lang="de-DE"/>
               <a:t>Zweite Ebene</a:t>
             </a:r>
           </a:p>
           <a:p>
             <a:pPr lvl="2"/>
             <a:r>
-              <a:rPr lang="de-DE" smtClean="0"/>
+              <a:rPr lang="de-DE"/>
               <a:t>Dritte Ebene</a:t>
             </a:r>
           </a:p>
           <a:p>
             <a:pPr lvl="3"/>
             <a:r>
-              <a:rPr lang="de-DE" smtClean="0"/>
+              <a:rPr lang="de-DE"/>
               <a:t>Vierte Ebene</a:t>
             </a:r>
           </a:p>
           <a:p>
             <a:pPr lvl="4"/>
             <a:r>
-              <a:rPr lang="de-DE" smtClean="0"/>
+              <a:rPr lang="de-DE"/>
               <a:t>Fünfte Ebene</a:t>
             </a:r>
             <a:endParaRPr lang="en-US" dirty="0"/>
@@ -979,9 +985,9 @@
           <a:p>
             <a:fld id="{49C59592-045F-4046-8645-2085C4B816F7}" type="datetimeFigureOut">
               <a:rPr lang="de-DE" smtClean="0"/>
-              <a:t>03.06.2019</a:t>
+              <a:t>04.06.2019</a:t>
             </a:fld>
-            <a:endParaRPr lang="de-DE"/>
+            <a:endParaRPr lang="de-DE" dirty="0"/>
           </a:p>
         </p:txBody>
       </p:sp>
@@ -1000,7 +1006,7 @@
           <a:bodyPr/>
           <a:lstStyle/>
           <a:p>
-            <a:endParaRPr lang="de-DE"/>
+            <a:endParaRPr lang="de-DE" dirty="0"/>
           </a:p>
         </p:txBody>
       </p:sp>
@@ -1021,9 +1027,9 @@
           <a:p>
             <a:fld id="{2C26B24D-DB5E-4E92-A315-6B2CE60C0022}" type="slidenum">
               <a:rPr lang="de-DE" smtClean="0"/>
-              <a:t>‹Nr.›</a:t>
+              <a:t>‹#›</a:t>
             </a:fld>
-            <a:endParaRPr lang="de-DE"/>
+            <a:endParaRPr lang="de-DE" dirty="0"/>
           </a:p>
         </p:txBody>
       </p:sp>
@@ -1178,7 +1184,7 @@
           </a:lstStyle>
           <a:p>
             <a:r>
-              <a:rPr lang="de-DE" smtClean="0"/>
+              <a:rPr lang="de-DE"/>
               <a:t>Titelmasterformat durch Klicken bearbeiten</a:t>
             </a:r>
             <a:endParaRPr lang="en-US" dirty="0"/>
@@ -1299,7 +1305,7 @@
           <a:p>
             <a:pPr lvl="0"/>
             <a:r>
-              <a:rPr lang="de-DE" smtClean="0"/>
+              <a:rPr lang="de-DE"/>
               <a:t>Textmasterformat bearbeiten</a:t>
             </a:r>
           </a:p>
@@ -1322,9 +1328,9 @@
           <a:p>
             <a:fld id="{49C59592-045F-4046-8645-2085C4B816F7}" type="datetimeFigureOut">
               <a:rPr lang="de-DE" smtClean="0"/>
-              <a:t>03.06.2019</a:t>
+              <a:t>04.06.2019</a:t>
             </a:fld>
-            <a:endParaRPr lang="de-DE"/>
+            <a:endParaRPr lang="de-DE" dirty="0"/>
           </a:p>
         </p:txBody>
       </p:sp>
@@ -1343,7 +1349,7 @@
           <a:bodyPr/>
           <a:lstStyle/>
           <a:p>
-            <a:endParaRPr lang="de-DE"/>
+            <a:endParaRPr lang="de-DE" dirty="0"/>
           </a:p>
         </p:txBody>
       </p:sp>
@@ -1364,9 +1370,9 @@
           <a:p>
             <a:fld id="{2C26B24D-DB5E-4E92-A315-6B2CE60C0022}" type="slidenum">
               <a:rPr lang="de-DE" smtClean="0"/>
-              <a:t>‹Nr.›</a:t>
+              <a:t>‹#›</a:t>
             </a:fld>
-            <a:endParaRPr lang="de-DE"/>
+            <a:endParaRPr lang="de-DE" dirty="0"/>
           </a:p>
         </p:txBody>
       </p:sp>
@@ -1459,7 +1465,7 @@
           <a:lstStyle/>
           <a:p>
             <a:r>
-              <a:rPr lang="de-DE" smtClean="0"/>
+              <a:rPr lang="de-DE"/>
               <a:t>Titelmasterformat durch Klicken bearbeiten</a:t>
             </a:r>
             <a:endParaRPr lang="en-US" dirty="0"/>
@@ -1488,35 +1494,35 @@
           <a:p>
             <a:pPr lvl="0"/>
             <a:r>
-              <a:rPr lang="de-DE" smtClean="0"/>
+              <a:rPr lang="de-DE"/>
               <a:t>Textmasterformat bearbeiten</a:t>
             </a:r>
           </a:p>
           <a:p>
             <a:pPr lvl="1"/>
             <a:r>
-              <a:rPr lang="de-DE" smtClean="0"/>
+              <a:rPr lang="de-DE"/>
               <a:t>Zweite Ebene</a:t>
             </a:r>
           </a:p>
           <a:p>
             <a:pPr lvl="2"/>
             <a:r>
-              <a:rPr lang="de-DE" smtClean="0"/>
+              <a:rPr lang="de-DE"/>
               <a:t>Dritte Ebene</a:t>
             </a:r>
           </a:p>
           <a:p>
             <a:pPr lvl="3"/>
             <a:r>
-              <a:rPr lang="de-DE" smtClean="0"/>
+              <a:rPr lang="de-DE"/>
               <a:t>Vierte Ebene</a:t>
             </a:r>
           </a:p>
           <a:p>
             <a:pPr lvl="4"/>
             <a:r>
-              <a:rPr lang="de-DE" smtClean="0"/>
+              <a:rPr lang="de-DE"/>
               <a:t>Fünfte Ebene</a:t>
             </a:r>
             <a:endParaRPr lang="en-US" dirty="0"/>
@@ -1545,35 +1551,35 @@
           <a:p>
             <a:pPr lvl="0"/>
             <a:r>
-              <a:rPr lang="de-DE" smtClean="0"/>
+              <a:rPr lang="de-DE"/>
               <a:t>Textmasterformat bearbeiten</a:t>
             </a:r>
           </a:p>
           <a:p>
             <a:pPr lvl="1"/>
             <a:r>
-              <a:rPr lang="de-DE" smtClean="0"/>
+              <a:rPr lang="de-DE"/>
               <a:t>Zweite Ebene</a:t>
             </a:r>
           </a:p>
           <a:p>
             <a:pPr lvl="2"/>
             <a:r>
-              <a:rPr lang="de-DE" smtClean="0"/>
+              <a:rPr lang="de-DE"/>
               <a:t>Dritte Ebene</a:t>
             </a:r>
           </a:p>
           <a:p>
             <a:pPr lvl="3"/>
             <a:r>
-              <a:rPr lang="de-DE" smtClean="0"/>
+              <a:rPr lang="de-DE"/>
               <a:t>Vierte Ebene</a:t>
             </a:r>
           </a:p>
           <a:p>
             <a:pPr lvl="4"/>
             <a:r>
-              <a:rPr lang="de-DE" smtClean="0"/>
+              <a:rPr lang="de-DE"/>
               <a:t>Fünfte Ebene</a:t>
             </a:r>
             <a:endParaRPr lang="en-US" dirty="0"/>
@@ -1597,9 +1603,9 @@
           <a:p>
             <a:fld id="{49C59592-045F-4046-8645-2085C4B816F7}" type="datetimeFigureOut">
               <a:rPr lang="de-DE" smtClean="0"/>
-              <a:t>03.06.2019</a:t>
+              <a:t>04.06.2019</a:t>
             </a:fld>
-            <a:endParaRPr lang="de-DE"/>
+            <a:endParaRPr lang="de-DE" dirty="0"/>
           </a:p>
         </p:txBody>
       </p:sp>
@@ -1618,7 +1624,7 @@
           <a:bodyPr/>
           <a:lstStyle/>
           <a:p>
-            <a:endParaRPr lang="de-DE"/>
+            <a:endParaRPr lang="de-DE" dirty="0"/>
           </a:p>
         </p:txBody>
       </p:sp>
@@ -1639,9 +1645,9 @@
           <a:p>
             <a:fld id="{2C26B24D-DB5E-4E92-A315-6B2CE60C0022}" type="slidenum">
               <a:rPr lang="de-DE" smtClean="0"/>
-              <a:t>‹Nr.›</a:t>
+              <a:t>‹#›</a:t>
             </a:fld>
-            <a:endParaRPr lang="de-DE"/>
+            <a:endParaRPr lang="de-DE" dirty="0"/>
           </a:p>
         </p:txBody>
       </p:sp>
@@ -1696,7 +1702,7 @@
           <a:lstStyle/>
           <a:p>
             <a:r>
-              <a:rPr lang="de-DE" smtClean="0"/>
+              <a:rPr lang="de-DE"/>
               <a:t>Titelmasterformat durch Klicken bearbeiten</a:t>
             </a:r>
             <a:endParaRPr lang="en-US" dirty="0"/>
@@ -1768,7 +1774,7 @@
           <a:p>
             <a:pPr lvl="0"/>
             <a:r>
-              <a:rPr lang="de-DE" smtClean="0"/>
+              <a:rPr lang="de-DE"/>
               <a:t>Textmasterformat bearbeiten</a:t>
             </a:r>
           </a:p>
@@ -1796,35 +1802,35 @@
           <a:p>
             <a:pPr lvl="0"/>
             <a:r>
-              <a:rPr lang="de-DE" smtClean="0"/>
+              <a:rPr lang="de-DE"/>
               <a:t>Textmasterformat bearbeiten</a:t>
             </a:r>
           </a:p>
           <a:p>
             <a:pPr lvl="1"/>
             <a:r>
-              <a:rPr lang="de-DE" smtClean="0"/>
+              <a:rPr lang="de-DE"/>
               <a:t>Zweite Ebene</a:t>
             </a:r>
           </a:p>
           <a:p>
             <a:pPr lvl="2"/>
             <a:r>
-              <a:rPr lang="de-DE" smtClean="0"/>
+              <a:rPr lang="de-DE"/>
               <a:t>Dritte Ebene</a:t>
             </a:r>
           </a:p>
           <a:p>
             <a:pPr lvl="3"/>
             <a:r>
-              <a:rPr lang="de-DE" smtClean="0"/>
+              <a:rPr lang="de-DE"/>
               <a:t>Vierte Ebene</a:t>
             </a:r>
           </a:p>
           <a:p>
             <a:pPr lvl="4"/>
             <a:r>
-              <a:rPr lang="de-DE" smtClean="0"/>
+              <a:rPr lang="de-DE"/>
               <a:t>Fünfte Ebene</a:t>
             </a:r>
             <a:endParaRPr lang="en-US" dirty="0"/>
@@ -1896,7 +1902,7 @@
           <a:p>
             <a:pPr lvl="0"/>
             <a:r>
-              <a:rPr lang="de-DE" smtClean="0"/>
+              <a:rPr lang="de-DE"/>
               <a:t>Textmasterformat bearbeiten</a:t>
             </a:r>
           </a:p>
@@ -1924,35 +1930,35 @@
           <a:p>
             <a:pPr lvl="0"/>
             <a:r>
-              <a:rPr lang="de-DE" smtClean="0"/>
+              <a:rPr lang="de-DE"/>
               <a:t>Textmasterformat bearbeiten</a:t>
             </a:r>
           </a:p>
           <a:p>
             <a:pPr lvl="1"/>
             <a:r>
-              <a:rPr lang="de-DE" smtClean="0"/>
+              <a:rPr lang="de-DE"/>
               <a:t>Zweite Ebene</a:t>
             </a:r>
           </a:p>
           <a:p>
             <a:pPr lvl="2"/>
             <a:r>
-              <a:rPr lang="de-DE" smtClean="0"/>
+              <a:rPr lang="de-DE"/>
               <a:t>Dritte Ebene</a:t>
             </a:r>
           </a:p>
           <a:p>
             <a:pPr lvl="3"/>
             <a:r>
-              <a:rPr lang="de-DE" smtClean="0"/>
+              <a:rPr lang="de-DE"/>
               <a:t>Vierte Ebene</a:t>
             </a:r>
           </a:p>
           <a:p>
             <a:pPr lvl="4"/>
             <a:r>
-              <a:rPr lang="de-DE" smtClean="0"/>
+              <a:rPr lang="de-DE"/>
               <a:t>Fünfte Ebene</a:t>
             </a:r>
             <a:endParaRPr lang="en-US" dirty="0"/>
@@ -1976,9 +1982,9 @@
           <a:p>
             <a:fld id="{49C59592-045F-4046-8645-2085C4B816F7}" type="datetimeFigureOut">
               <a:rPr lang="de-DE" smtClean="0"/>
-              <a:t>03.06.2019</a:t>
+              <a:t>04.06.2019</a:t>
             </a:fld>
-            <a:endParaRPr lang="de-DE"/>
+            <a:endParaRPr lang="de-DE" dirty="0"/>
           </a:p>
         </p:txBody>
       </p:sp>
@@ -1997,7 +2003,7 @@
           <a:bodyPr/>
           <a:lstStyle/>
           <a:p>
-            <a:endParaRPr lang="de-DE"/>
+            <a:endParaRPr lang="de-DE" dirty="0"/>
           </a:p>
         </p:txBody>
       </p:sp>
@@ -2018,9 +2024,9 @@
           <a:p>
             <a:fld id="{2C26B24D-DB5E-4E92-A315-6B2CE60C0022}" type="slidenum">
               <a:rPr lang="de-DE" smtClean="0"/>
-              <a:t>‹Nr.›</a:t>
+              <a:t>‹#›</a:t>
             </a:fld>
-            <a:endParaRPr lang="de-DE"/>
+            <a:endParaRPr lang="de-DE" dirty="0"/>
           </a:p>
         </p:txBody>
       </p:sp>
@@ -2070,7 +2076,7 @@
           <a:lstStyle/>
           <a:p>
             <a:r>
-              <a:rPr lang="de-DE" smtClean="0"/>
+              <a:rPr lang="de-DE"/>
               <a:t>Titelmasterformat durch Klicken bearbeiten</a:t>
             </a:r>
             <a:endParaRPr lang="en-US" dirty="0"/>
@@ -2094,9 +2100,9 @@
           <a:p>
             <a:fld id="{49C59592-045F-4046-8645-2085C4B816F7}" type="datetimeFigureOut">
               <a:rPr lang="de-DE" smtClean="0"/>
-              <a:t>03.06.2019</a:t>
+              <a:t>04.06.2019</a:t>
             </a:fld>
-            <a:endParaRPr lang="de-DE"/>
+            <a:endParaRPr lang="de-DE" dirty="0"/>
           </a:p>
         </p:txBody>
       </p:sp>
@@ -2115,7 +2121,7 @@
           <a:bodyPr/>
           <a:lstStyle/>
           <a:p>
-            <a:endParaRPr lang="de-DE"/>
+            <a:endParaRPr lang="de-DE" dirty="0"/>
           </a:p>
         </p:txBody>
       </p:sp>
@@ -2136,9 +2142,9 @@
           <a:p>
             <a:fld id="{2C26B24D-DB5E-4E92-A315-6B2CE60C0022}" type="slidenum">
               <a:rPr lang="de-DE" smtClean="0"/>
-              <a:t>‹Nr.›</a:t>
+              <a:t>‹#›</a:t>
             </a:fld>
-            <a:endParaRPr lang="de-DE"/>
+            <a:endParaRPr lang="de-DE" dirty="0"/>
           </a:p>
         </p:txBody>
       </p:sp>
@@ -2265,9 +2271,9 @@
           <a:p>
             <a:fld id="{49C59592-045F-4046-8645-2085C4B816F7}" type="datetimeFigureOut">
               <a:rPr lang="de-DE" smtClean="0"/>
-              <a:t>03.06.2019</a:t>
+              <a:t>04.06.2019</a:t>
             </a:fld>
-            <a:endParaRPr lang="de-DE"/>
+            <a:endParaRPr lang="de-DE" dirty="0"/>
           </a:p>
         </p:txBody>
       </p:sp>
@@ -2294,7 +2300,7 @@
             </a:lvl1pPr>
           </a:lstStyle>
           <a:p>
-            <a:endParaRPr lang="de-DE"/>
+            <a:endParaRPr lang="de-DE" dirty="0"/>
           </a:p>
         </p:txBody>
       </p:sp>
@@ -2315,9 +2321,9 @@
           <a:p>
             <a:fld id="{2C26B24D-DB5E-4E92-A315-6B2CE60C0022}" type="slidenum">
               <a:rPr lang="de-DE" smtClean="0"/>
-              <a:t>‹Nr.›</a:t>
+              <a:t>‹#›</a:t>
             </a:fld>
-            <a:endParaRPr lang="de-DE"/>
+            <a:endParaRPr lang="de-DE" dirty="0"/>
           </a:p>
         </p:txBody>
       </p:sp>
@@ -2458,7 +2464,7 @@
           </a:lstStyle>
           <a:p>
             <a:r>
-              <a:rPr lang="de-DE" smtClean="0"/>
+              <a:rPr lang="de-DE"/>
               <a:t>Titelmasterformat durch Klicken bearbeiten</a:t>
             </a:r>
             <a:endParaRPr lang="en-US" dirty="0"/>
@@ -2487,35 +2493,35 @@
           <a:p>
             <a:pPr lvl="0"/>
             <a:r>
-              <a:rPr lang="de-DE" smtClean="0"/>
+              <a:rPr lang="de-DE"/>
               <a:t>Textmasterformat bearbeiten</a:t>
             </a:r>
           </a:p>
           <a:p>
             <a:pPr lvl="1"/>
             <a:r>
-              <a:rPr lang="de-DE" smtClean="0"/>
+              <a:rPr lang="de-DE"/>
               <a:t>Zweite Ebene</a:t>
             </a:r>
           </a:p>
           <a:p>
             <a:pPr lvl="2"/>
             <a:r>
-              <a:rPr lang="de-DE" smtClean="0"/>
+              <a:rPr lang="de-DE"/>
               <a:t>Dritte Ebene</a:t>
             </a:r>
           </a:p>
           <a:p>
             <a:pPr lvl="3"/>
             <a:r>
-              <a:rPr lang="de-DE" smtClean="0"/>
+              <a:rPr lang="de-DE"/>
               <a:t>Vierte Ebene</a:t>
             </a:r>
           </a:p>
           <a:p>
             <a:pPr lvl="4"/>
             <a:r>
-              <a:rPr lang="de-DE" smtClean="0"/>
+              <a:rPr lang="de-DE"/>
               <a:t>Fünfte Ebene</a:t>
             </a:r>
             <a:endParaRPr lang="en-US" dirty="0"/>
@@ -2587,7 +2593,7 @@
           <a:p>
             <a:pPr lvl="0"/>
             <a:r>
-              <a:rPr lang="de-DE" smtClean="0"/>
+              <a:rPr lang="de-DE"/>
               <a:t>Textmasterformat bearbeiten</a:t>
             </a:r>
           </a:p>
@@ -2619,9 +2625,9 @@
           <a:p>
             <a:fld id="{49C59592-045F-4046-8645-2085C4B816F7}" type="datetimeFigureOut">
               <a:rPr lang="de-DE" smtClean="0"/>
-              <a:t>03.06.2019</a:t>
+              <a:t>04.06.2019</a:t>
             </a:fld>
-            <a:endParaRPr lang="de-DE"/>
+            <a:endParaRPr lang="de-DE" dirty="0"/>
           </a:p>
         </p:txBody>
       </p:sp>
@@ -2653,7 +2659,7 @@
             </a:lvl1pPr>
           </a:lstStyle>
           <a:p>
-            <a:endParaRPr lang="de-DE"/>
+            <a:endParaRPr lang="de-DE" dirty="0"/>
           </a:p>
         </p:txBody>
       </p:sp>
@@ -2682,9 +2688,9 @@
           <a:p>
             <a:fld id="{2C26B24D-DB5E-4E92-A315-6B2CE60C0022}" type="slidenum">
               <a:rPr lang="de-DE" smtClean="0"/>
-              <a:t>‹Nr.›</a:t>
+              <a:t>‹#›</a:t>
             </a:fld>
-            <a:endParaRPr lang="de-DE"/>
+            <a:endParaRPr lang="de-DE" dirty="0"/>
           </a:p>
         </p:txBody>
       </p:sp>
@@ -2825,7 +2831,7 @@
           </a:lstStyle>
           <a:p>
             <a:r>
-              <a:rPr lang="de-DE" smtClean="0"/>
+              <a:rPr lang="de-DE"/>
               <a:t>Titelmasterformat durch Klicken bearbeiten</a:t>
             </a:r>
             <a:endParaRPr lang="en-US" dirty="0"/>
@@ -2900,7 +2906,7 @@
           </a:lstStyle>
           <a:p>
             <a:r>
-              <a:rPr lang="de-DE" smtClean="0"/>
+              <a:rPr lang="de-DE" dirty="0"/>
               <a:t>Bild durch Klicken auf Symbol hinzufügen</a:t>
             </a:r>
             <a:endParaRPr lang="en-US" dirty="0"/>
@@ -2978,7 +2984,7 @@
           <a:p>
             <a:pPr lvl="0"/>
             <a:r>
-              <a:rPr lang="de-DE" smtClean="0"/>
+              <a:rPr lang="de-DE"/>
               <a:t>Textmasterformat bearbeiten</a:t>
             </a:r>
           </a:p>
@@ -3001,9 +3007,9 @@
           <a:p>
             <a:fld id="{49C59592-045F-4046-8645-2085C4B816F7}" type="datetimeFigureOut">
               <a:rPr lang="de-DE" smtClean="0"/>
-              <a:t>03.06.2019</a:t>
+              <a:t>04.06.2019</a:t>
             </a:fld>
-            <a:endParaRPr lang="de-DE"/>
+            <a:endParaRPr lang="de-DE" dirty="0"/>
           </a:p>
         </p:txBody>
       </p:sp>
@@ -3022,7 +3028,7 @@
           <a:bodyPr/>
           <a:lstStyle/>
           <a:p>
-            <a:endParaRPr lang="de-DE"/>
+            <a:endParaRPr lang="de-DE" dirty="0"/>
           </a:p>
         </p:txBody>
       </p:sp>
@@ -3043,9 +3049,9 @@
           <a:p>
             <a:fld id="{2C26B24D-DB5E-4E92-A315-6B2CE60C0022}" type="slidenum">
               <a:rPr lang="de-DE" smtClean="0"/>
-              <a:t>‹Nr.›</a:t>
+              <a:t>‹#›</a:t>
             </a:fld>
-            <a:endParaRPr lang="de-DE"/>
+            <a:endParaRPr lang="de-DE" dirty="0"/>
           </a:p>
         </p:txBody>
       </p:sp>
@@ -3186,7 +3192,7 @@
           <a:lstStyle/>
           <a:p>
             <a:r>
-              <a:rPr lang="de-DE" smtClean="0"/>
+              <a:rPr lang="de-DE"/>
               <a:t>Titelmasterformat durch Klicken bearbeiten</a:t>
             </a:r>
             <a:endParaRPr lang="en-US" dirty="0"/>
@@ -3220,35 +3226,35 @@
           <a:p>
             <a:pPr lvl="0"/>
             <a:r>
-              <a:rPr lang="de-DE" smtClean="0"/>
+              <a:rPr lang="de-DE"/>
               <a:t>Textmasterformat bearbeiten</a:t>
             </a:r>
           </a:p>
           <a:p>
             <a:pPr lvl="1"/>
             <a:r>
-              <a:rPr lang="de-DE" smtClean="0"/>
+              <a:rPr lang="de-DE"/>
               <a:t>Zweite Ebene</a:t>
             </a:r>
           </a:p>
           <a:p>
             <a:pPr lvl="2"/>
             <a:r>
-              <a:rPr lang="de-DE" smtClean="0"/>
+              <a:rPr lang="de-DE"/>
               <a:t>Dritte Ebene</a:t>
             </a:r>
           </a:p>
           <a:p>
             <a:pPr lvl="3"/>
             <a:r>
-              <a:rPr lang="de-DE" smtClean="0"/>
+              <a:rPr lang="de-DE"/>
               <a:t>Vierte Ebene</a:t>
             </a:r>
           </a:p>
           <a:p>
             <a:pPr lvl="4"/>
             <a:r>
-              <a:rPr lang="de-DE" smtClean="0"/>
+              <a:rPr lang="de-DE"/>
               <a:t>Fünfte Ebene</a:t>
             </a:r>
             <a:endParaRPr lang="en-US" dirty="0"/>
@@ -3288,9 +3294,9 @@
           <a:p>
             <a:fld id="{49C59592-045F-4046-8645-2085C4B816F7}" type="datetimeFigureOut">
               <a:rPr lang="de-DE" smtClean="0"/>
-              <a:t>03.06.2019</a:t>
+              <a:t>04.06.2019</a:t>
             </a:fld>
-            <a:endParaRPr lang="de-DE"/>
+            <a:endParaRPr lang="de-DE" dirty="0"/>
           </a:p>
         </p:txBody>
       </p:sp>
@@ -3325,7 +3331,7 @@
             </a:lvl1pPr>
           </a:lstStyle>
           <a:p>
-            <a:endParaRPr lang="de-DE"/>
+            <a:endParaRPr lang="de-DE" dirty="0"/>
           </a:p>
         </p:txBody>
       </p:sp>
@@ -3362,9 +3368,9 @@
           <a:p>
             <a:fld id="{2C26B24D-DB5E-4E92-A315-6B2CE60C0022}" type="slidenum">
               <a:rPr lang="de-DE" smtClean="0"/>
-              <a:t>‹Nr.›</a:t>
+              <a:t>‹#›</a:t>
             </a:fld>
-            <a:endParaRPr lang="de-DE"/>
+            <a:endParaRPr lang="de-DE" dirty="0"/>
           </a:p>
         </p:txBody>
       </p:sp>
@@ -3828,18 +3834,9 @@
           <a:lstStyle/>
           <a:p>
             <a:r>
-              <a:rPr lang="de-DE" dirty="0" err="1" smtClean="0"/>
-              <a:t>Exeption</a:t>
-            </a:r>
-            <a:r>
-              <a:rPr lang="de-DE" dirty="0" smtClean="0"/>
-              <a:t>: </a:t>
-            </a:r>
-            <a:r>
-              <a:rPr lang="de-DE" dirty="0" err="1" smtClean="0"/>
-              <a:t>NameNotFound</a:t>
-            </a:r>
-            <a:endParaRPr lang="de-DE" dirty="0"/>
+              <a:rPr lang="de-DE" dirty="0"/>
+              <a:t>Error: NameNotFound</a:t>
+            </a:r>
           </a:p>
         </p:txBody>
       </p:sp>
@@ -3858,7 +3855,10 @@
           <a:bodyPr/>
           <a:lstStyle/>
           <a:p>
-            <a:endParaRPr lang="de-DE"/>
+            <a:r>
+              <a:rPr lang="de-DE" dirty="0"/>
+              <a:t>Von Bastian Schäfer, Moritz Wahlenmeier &amp; Stephen Heisser</a:t>
+            </a:r>
           </a:p>
         </p:txBody>
       </p:sp>
@@ -3872,13 +3872,84 @@
   <p:clrMapOvr>
     <a:masterClrMapping/>
   </p:clrMapOvr>
-  <p:timing>
-    <p:tnLst>
-      <p:par>
-        <p:cTn id="1" dur="indefinite" restart="never" nodeType="tmRoot"/>
-      </p:par>
-    </p:tnLst>
-  </p:timing>
+</p:sld>
+</file>
+
+<file path=ppt/slides/slide10.xml><?xml version="1.0" encoding="utf-8"?>
+<p:sld xmlns:a="http://schemas.openxmlformats.org/drawingml/2006/main" xmlns:r="http://schemas.openxmlformats.org/officeDocument/2006/relationships" xmlns:p="http://schemas.openxmlformats.org/presentationml/2006/main">
+  <p:cSld>
+    <p:spTree>
+      <p:nvGrpSpPr>
+        <p:cNvPr id="1" name=""/>
+        <p:cNvGrpSpPr/>
+        <p:nvPr/>
+      </p:nvGrpSpPr>
+      <p:grpSpPr>
+        <a:xfrm>
+          <a:off x="0" y="0"/>
+          <a:ext cx="0" cy="0"/>
+          <a:chOff x="0" y="0"/>
+          <a:chExt cx="0" cy="0"/>
+        </a:xfrm>
+      </p:grpSpPr>
+      <p:sp>
+        <p:nvSpPr>
+          <p:cNvPr id="2" name="Titel 1"/>
+          <p:cNvSpPr>
+            <a:spLocks noGrp="1"/>
+          </p:cNvSpPr>
+          <p:nvPr>
+            <p:ph type="title"/>
+          </p:nvPr>
+        </p:nvSpPr>
+        <p:spPr/>
+        <p:txBody>
+          <a:bodyPr/>
+          <a:lstStyle/>
+          <a:p>
+            <a:r>
+              <a:rPr lang="de-DE" dirty="0"/>
+              <a:t>Fazit</a:t>
+            </a:r>
+          </a:p>
+        </p:txBody>
+      </p:sp>
+      <p:sp>
+        <p:nvSpPr>
+          <p:cNvPr id="3" name="Inhaltsplatzhalter 2"/>
+          <p:cNvSpPr>
+            <a:spLocks noGrp="1"/>
+          </p:cNvSpPr>
+          <p:nvPr>
+            <p:ph idx="1"/>
+          </p:nvPr>
+        </p:nvSpPr>
+        <p:spPr/>
+        <p:txBody>
+          <a:bodyPr/>
+          <a:lstStyle/>
+          <a:p>
+            <a:pPr>
+              <a:buFont typeface="Arial" panose="020B0604020202020204" pitchFamily="34" charset="0"/>
+              <a:buChar char="•"/>
+            </a:pPr>
+            <a:r>
+              <a:rPr lang="de-DE" dirty="0"/>
+              <a:t> </a:t>
+            </a:r>
+          </a:p>
+        </p:txBody>
+      </p:sp>
+    </p:spTree>
+    <p:extLst>
+      <p:ext uri="{BB962C8B-B14F-4D97-AF65-F5344CB8AC3E}">
+        <p14:creationId xmlns:p14="http://schemas.microsoft.com/office/powerpoint/2010/main" val="505189340"/>
+      </p:ext>
+    </p:extLst>
+  </p:cSld>
+  <p:clrMapOvr>
+    <a:masterClrMapping/>
+  </p:clrMapOvr>
 </p:sld>
 </file>
 
@@ -3915,10 +3986,9 @@
           <a:lstStyle/>
           <a:p>
             <a:r>
-              <a:rPr lang="de-DE" dirty="0" smtClean="0"/>
+              <a:rPr lang="de-DE" dirty="0"/>
               <a:t>Inhaltsverzeichnis</a:t>
             </a:r>
-            <a:endParaRPr lang="de-DE" dirty="0"/>
           </a:p>
         </p:txBody>
       </p:sp>
@@ -3942,8 +4012,8 @@
               <a:buChar char="v"/>
             </a:pPr>
             <a:r>
-              <a:rPr lang="de-DE" dirty="0" smtClean="0"/>
-              <a:t> Vorstellung der Projektgruppe</a:t>
+              <a:rPr lang="de-DE" dirty="0"/>
+              <a:t>Inhaltsverzeichnis</a:t>
             </a:r>
           </a:p>
           <a:p>
@@ -3952,16 +4022,8 @@
               <a:buChar char="v"/>
             </a:pPr>
             <a:r>
-              <a:rPr lang="de-DE" dirty="0" smtClean="0"/>
-              <a:t> Vorstellung </a:t>
-            </a:r>
-            <a:r>
               <a:rPr lang="de-DE" dirty="0"/>
-              <a:t>des Ursprungsprogrammes</a:t>
-            </a:r>
-            <a:r>
-              <a:rPr lang="de-DE" dirty="0" smtClean="0"/>
-              <a:t> </a:t>
+              <a:t>Vorstellung der Projektgruppe</a:t>
             </a:r>
           </a:p>
           <a:p>
@@ -3970,18 +4032,8 @@
               <a:buChar char="v"/>
             </a:pPr>
             <a:r>
-              <a:rPr lang="de-DE" dirty="0" smtClean="0"/>
-              <a:t> Vorstellung des Projektes </a:t>
-            </a:r>
-          </a:p>
-          <a:p>
-            <a:pPr lvl="1">
-              <a:buFont typeface="Wingdings" panose="05000000000000000000" pitchFamily="2" charset="2"/>
-              <a:buChar char="v"/>
-            </a:pPr>
-            <a:r>
-              <a:rPr lang="de-DE" dirty="0" smtClean="0"/>
-              <a:t> Vorstellung der „Verbesserten“ Version</a:t>
+              <a:rPr lang="de-DE" dirty="0"/>
+              <a:t>Projektbeschreibung</a:t>
             </a:r>
           </a:p>
           <a:p>
@@ -3990,8 +4042,8 @@
               <a:buChar char="v"/>
             </a:pPr>
             <a:r>
-              <a:rPr lang="de-DE" dirty="0" smtClean="0"/>
-              <a:t> Projektplan</a:t>
+              <a:rPr lang="de-DE" dirty="0"/>
+              <a:t>Vorstellung des Ursprungsprogrammes</a:t>
             </a:r>
           </a:p>
           <a:p>
@@ -4001,11 +4053,7 @@
             </a:pPr>
             <a:r>
               <a:rPr lang="de-DE" dirty="0"/>
-              <a:t> </a:t>
-            </a:r>
-            <a:r>
-              <a:rPr lang="de-DE" dirty="0" smtClean="0"/>
-              <a:t>Probleme</a:t>
+              <a:t>Zeigen des Programms</a:t>
             </a:r>
           </a:p>
           <a:p>
@@ -4014,8 +4062,8 @@
               <a:buChar char="v"/>
             </a:pPr>
             <a:r>
-              <a:rPr lang="de-DE" dirty="0" smtClean="0"/>
-              <a:t> Mögliche Problemlösung</a:t>
+              <a:rPr lang="de-DE" dirty="0"/>
+              <a:t>Zeitplanung/Umsetzung</a:t>
             </a:r>
           </a:p>
           <a:p>
@@ -4024,8 +4072,28 @@
               <a:buChar char="v"/>
             </a:pPr>
             <a:r>
-              <a:rPr lang="de-DE" dirty="0" smtClean="0"/>
-              <a:t> Fazit</a:t>
+              <a:rPr lang="de-DE" dirty="0"/>
+              <a:t>Probleme</a:t>
+            </a:r>
+          </a:p>
+          <a:p>
+            <a:pPr>
+              <a:buFont typeface="Wingdings" panose="05000000000000000000" pitchFamily="2" charset="2"/>
+              <a:buChar char="v"/>
+            </a:pPr>
+            <a:r>
+              <a:rPr lang="de-DE" dirty="0"/>
+              <a:t>Mögliche Problemlösungen</a:t>
+            </a:r>
+          </a:p>
+          <a:p>
+            <a:pPr>
+              <a:buFont typeface="Wingdings" panose="05000000000000000000" pitchFamily="2" charset="2"/>
+              <a:buChar char="v"/>
+            </a:pPr>
+            <a:r>
+              <a:rPr lang="de-DE" dirty="0"/>
+              <a:t>Fazit</a:t>
             </a:r>
           </a:p>
           <a:p>
@@ -4047,13 +4115,6 @@
   <p:clrMapOvr>
     <a:masterClrMapping/>
   </p:clrMapOvr>
-  <p:timing>
-    <p:tnLst>
-      <p:par>
-        <p:cTn id="1" dur="indefinite" restart="never" nodeType="tmRoot"/>
-      </p:par>
-    </p:tnLst>
-  </p:timing>
 </p:sld>
 </file>
 
@@ -4090,10 +4151,9 @@
           <a:lstStyle/>
           <a:p>
             <a:r>
-              <a:rPr lang="de-DE" dirty="0" smtClean="0"/>
+              <a:rPr lang="de-DE" dirty="0"/>
               <a:t>Vorstellung der Projektgruppe</a:t>
             </a:r>
-            <a:endParaRPr lang="de-DE" dirty="0"/>
           </a:p>
         </p:txBody>
       </p:sp>
@@ -4117,10 +4177,9 @@
               <a:buChar char="•"/>
             </a:pPr>
             <a:r>
-              <a:rPr lang="de-DE" dirty="0" smtClean="0"/>
+              <a:rPr lang="de-DE" dirty="0"/>
               <a:t> </a:t>
             </a:r>
-            <a:endParaRPr lang="de-DE" dirty="0"/>
           </a:p>
         </p:txBody>
       </p:sp>
@@ -4134,13 +4193,6 @@
   <p:clrMapOvr>
     <a:masterClrMapping/>
   </p:clrMapOvr>
-  <p:timing>
-    <p:tnLst>
-      <p:par>
-        <p:cTn id="1" dur="indefinite" restart="never" nodeType="tmRoot"/>
-      </p:par>
-    </p:tnLst>
-  </p:timing>
 </p:sld>
 </file>
 
@@ -4177,16 +4229,21 @@
           <a:lstStyle/>
           <a:p>
             <a:r>
-              <a:rPr lang="de-DE" dirty="0" smtClean="0"/>
-              <a:t>Vorstellung des Ursprungsprogrammes</a:t>
-            </a:r>
-            <a:endParaRPr lang="de-DE" dirty="0"/>
-          </a:p>
-        </p:txBody>
-      </p:sp>
-      <p:sp>
-        <p:nvSpPr>
-          <p:cNvPr id="3" name="Inhaltsplatzhalter 2"/>
+              <a:rPr lang="de-DE" dirty="0"/>
+              <a:t>Projektbeschreibung</a:t>
+            </a:r>
+          </a:p>
+        </p:txBody>
+      </p:sp>
+      <p:sp>
+        <p:nvSpPr>
+          <p:cNvPr id="6" name="Content Placeholder 5">
+            <a:extLst>
+              <a:ext uri="{FF2B5EF4-FFF2-40B4-BE49-F238E27FC236}">
+                <a16:creationId xmlns:a16="http://schemas.microsoft.com/office/drawing/2014/main" id="{3B2DB908-731D-41C5-B42B-9125EA0E6A7A}"/>
+              </a:ext>
+            </a:extLst>
+          </p:cNvPr>
           <p:cNvSpPr>
             <a:spLocks noGrp="1"/>
           </p:cNvSpPr>
@@ -4194,40 +4251,124 @@
             <p:ph idx="1"/>
           </p:nvPr>
         </p:nvSpPr>
-        <p:spPr/>
-        <p:txBody>
-          <a:bodyPr/>
+        <p:spPr>
+          <a:xfrm>
+            <a:off x="1066800" y="1981201"/>
+            <a:ext cx="10058400" cy="4023360"/>
+          </a:xfrm>
+        </p:spPr>
+        <p:txBody>
+          <a:bodyPr>
+            <a:normAutofit/>
+          </a:bodyPr>
           <a:lstStyle/>
           <a:p>
-            <a:pPr>
-              <a:buFont typeface="Arial" panose="020B0604020202020204" pitchFamily="34" charset="0"/>
-              <a:buChar char="•"/>
+            <a:pPr marL="701040" indent="-342900">
+              <a:lnSpc>
+                <a:spcPct val="107000"/>
+              </a:lnSpc>
+              <a:spcAft>
+                <a:spcPts val="800"/>
+              </a:spcAft>
+              <a:buFont typeface="Wingdings" panose="05000000000000000000" pitchFamily="2" charset="2"/>
+              <a:buChar char="v"/>
             </a:pPr>
             <a:r>
-              <a:rPr lang="de-DE" dirty="0" smtClean="0"/>
-              <a:t> </a:t>
-            </a:r>
-            <a:endParaRPr lang="de-DE" dirty="0"/>
+              <a:rPr lang="de-DE" dirty="0">
+                <a:latin typeface="Calibri" panose="020F0502020204030204" pitchFamily="34" charset="0"/>
+                <a:ea typeface="Yu Mincho"/>
+                <a:cs typeface="Times New Roman" panose="02020603050405020304" pitchFamily="18" charset="0"/>
+              </a:rPr>
+              <a:t>Ziel: Ablösen von „Logiflash“. </a:t>
+            </a:r>
+          </a:p>
+          <a:p>
+            <a:pPr marL="701040" indent="-342900">
+              <a:lnSpc>
+                <a:spcPct val="107000"/>
+              </a:lnSpc>
+              <a:spcAft>
+                <a:spcPts val="800"/>
+              </a:spcAft>
+              <a:buFont typeface="Wingdings" panose="05000000000000000000" pitchFamily="2" charset="2"/>
+              <a:buChar char="v"/>
+            </a:pPr>
+            <a:r>
+              <a:rPr lang="de-DE" dirty="0">
+                <a:latin typeface="Calibri" panose="020F0502020204030204" pitchFamily="34" charset="0"/>
+                <a:ea typeface="Yu Mincho"/>
+                <a:cs typeface="Times New Roman" panose="02020603050405020304" pitchFamily="18" charset="0"/>
+              </a:rPr>
+              <a:t>Programmiersprache: C#(WPF)</a:t>
+            </a:r>
+          </a:p>
+          <a:p>
+            <a:pPr marL="701040" indent="-342900">
+              <a:lnSpc>
+                <a:spcPct val="107000"/>
+              </a:lnSpc>
+              <a:spcAft>
+                <a:spcPts val="800"/>
+              </a:spcAft>
+              <a:buFont typeface="Wingdings" panose="05000000000000000000" pitchFamily="2" charset="2"/>
+              <a:buChar char="v"/>
+            </a:pPr>
+            <a:r>
+              <a:rPr lang="de-DE" dirty="0">
+                <a:latin typeface="Calibri" panose="020F0502020204030204" pitchFamily="34" charset="0"/>
+                <a:ea typeface="Yu Mincho"/>
+                <a:cs typeface="Times New Roman" panose="02020603050405020304" pitchFamily="18" charset="0"/>
+              </a:rPr>
+              <a:t>Programmierumgebung: Visual Studio</a:t>
+            </a:r>
+          </a:p>
+          <a:p>
+            <a:pPr marL="701040" indent="-342900">
+              <a:lnSpc>
+                <a:spcPct val="107000"/>
+              </a:lnSpc>
+              <a:spcAft>
+                <a:spcPts val="800"/>
+              </a:spcAft>
+              <a:buFont typeface="Wingdings" panose="05000000000000000000" pitchFamily="2" charset="2"/>
+              <a:buChar char="v"/>
+            </a:pPr>
+            <a:r>
+              <a:rPr lang="de-DE" dirty="0">
+                <a:latin typeface="Calibri" panose="020F0502020204030204" pitchFamily="34" charset="0"/>
+                <a:ea typeface="Yu Mincho"/>
+                <a:cs typeface="Times New Roman" panose="02020603050405020304" pitchFamily="18" charset="0"/>
+              </a:rPr>
+              <a:t>Programm zur Teilung des Programms: GitHub Desktop</a:t>
+            </a:r>
+            <a:br>
+              <a:rPr lang="de-DE" dirty="0">
+                <a:latin typeface="Calibri" panose="020F0502020204030204" pitchFamily="34" charset="0"/>
+                <a:ea typeface="Yu Mincho"/>
+                <a:cs typeface="Times New Roman" panose="02020603050405020304" pitchFamily="18" charset="0"/>
+              </a:rPr>
+            </a:br>
+            <a:endParaRPr lang="de-DE" sz="1800" dirty="0">
+              <a:latin typeface="Calibri" panose="020F0502020204030204" pitchFamily="34" charset="0"/>
+              <a:ea typeface="DengXian"/>
+              <a:cs typeface="Times New Roman" panose="02020603050405020304" pitchFamily="18" charset="0"/>
+            </a:endParaRPr>
+          </a:p>
+          <a:p>
+            <a:endParaRPr lang="en-US" dirty="0"/>
           </a:p>
         </p:txBody>
       </p:sp>
     </p:spTree>
     <p:extLst>
       <p:ext uri="{BB962C8B-B14F-4D97-AF65-F5344CB8AC3E}">
-        <p14:creationId xmlns:p14="http://schemas.microsoft.com/office/powerpoint/2010/main" val="3668521372"/>
+        <p14:creationId xmlns:p14="http://schemas.microsoft.com/office/powerpoint/2010/main" val="2270602820"/>
       </p:ext>
     </p:extLst>
   </p:cSld>
   <p:clrMapOvr>
     <a:masterClrMapping/>
   </p:clrMapOvr>
-  <p:timing>
-    <p:tnLst>
-      <p:par>
-        <p:cTn id="1" dur="indefinite" restart="never" nodeType="tmRoot"/>
-      </p:par>
-    </p:tnLst>
-  </p:timing>
 </p:sld>
 </file>
 
@@ -4264,10 +4405,9 @@
           <a:lstStyle/>
           <a:p>
             <a:r>
-              <a:rPr lang="de-DE" dirty="0" smtClean="0"/>
-              <a:t>Projekt</a:t>
-            </a:r>
-            <a:endParaRPr lang="de-DE" dirty="0"/>
+              <a:rPr lang="de-DE" dirty="0"/>
+              <a:t>Vorstellung des Ursprungsprogrammes</a:t>
+            </a:r>
           </a:p>
         </p:txBody>
       </p:sp>
@@ -4297,189 +4437,16 @@
           </a:p>
         </p:txBody>
       </p:sp>
-      <p:sp>
-        <p:nvSpPr>
-          <p:cNvPr id="4" name="Rechteck 3"/>
-          <p:cNvSpPr/>
-          <p:nvPr/>
-        </p:nvSpPr>
-        <p:spPr>
-          <a:xfrm>
-            <a:off x="917448" y="1845734"/>
-            <a:ext cx="6096000" cy="3228256"/>
-          </a:xfrm>
-          <a:prstGeom prst="rect">
-            <a:avLst/>
-          </a:prstGeom>
-        </p:spPr>
-        <p:txBody>
-          <a:bodyPr>
-            <a:spAutoFit/>
-          </a:bodyPr>
-          <a:lstStyle/>
-          <a:p>
-            <a:pPr marL="449580">
-              <a:lnSpc>
-                <a:spcPct val="107000"/>
-              </a:lnSpc>
-              <a:spcAft>
-                <a:spcPts val="800"/>
-              </a:spcAft>
-            </a:pPr>
-            <a:r>
-              <a:rPr lang="de-DE" smtClean="0">
-                <a:effectLst/>
-                <a:latin typeface="Calibri" panose="020F0502020204030204" pitchFamily="34" charset="0"/>
-                <a:ea typeface="Yu Mincho"/>
-                <a:cs typeface="Times New Roman" panose="02020603050405020304" pitchFamily="18" charset="0"/>
-              </a:rPr>
-              <a:t>Ziel: </a:t>
-            </a:r>
-            <a:r>
-              <a:rPr lang="de-DE" dirty="0" smtClean="0">
-                <a:effectLst/>
-                <a:latin typeface="Calibri" panose="020F0502020204030204" pitchFamily="34" charset="0"/>
-                <a:ea typeface="Yu Mincho"/>
-                <a:cs typeface="Times New Roman" panose="02020603050405020304" pitchFamily="18" charset="0"/>
-              </a:rPr>
-              <a:t>ablösen des alten, auf Flash basierendem, Programms „</a:t>
-            </a:r>
-            <a:r>
-              <a:rPr lang="de-DE" dirty="0" err="1" smtClean="0">
-                <a:effectLst/>
-                <a:latin typeface="Calibri" panose="020F0502020204030204" pitchFamily="34" charset="0"/>
-                <a:ea typeface="Yu Mincho"/>
-                <a:cs typeface="Times New Roman" panose="02020603050405020304" pitchFamily="18" charset="0"/>
-              </a:rPr>
-              <a:t>Logiflash</a:t>
-            </a:r>
-            <a:r>
-              <a:rPr lang="de-DE" dirty="0" smtClean="0">
-                <a:effectLst/>
-                <a:latin typeface="Calibri" panose="020F0502020204030204" pitchFamily="34" charset="0"/>
-                <a:ea typeface="Yu Mincho"/>
-                <a:cs typeface="Times New Roman" panose="02020603050405020304" pitchFamily="18" charset="0"/>
-              </a:rPr>
-              <a:t>“. </a:t>
-            </a:r>
-            <a:br>
-              <a:rPr lang="de-DE" dirty="0" smtClean="0">
-                <a:effectLst/>
-                <a:latin typeface="Calibri" panose="020F0502020204030204" pitchFamily="34" charset="0"/>
-                <a:ea typeface="Yu Mincho"/>
-                <a:cs typeface="Times New Roman" panose="02020603050405020304" pitchFamily="18" charset="0"/>
-              </a:rPr>
-            </a:br>
-            <a:endParaRPr lang="de-DE" dirty="0" smtClean="0">
-              <a:effectLst/>
-              <a:latin typeface="Calibri" panose="020F0502020204030204" pitchFamily="34" charset="0"/>
-              <a:ea typeface="Yu Mincho"/>
-              <a:cs typeface="Times New Roman" panose="02020603050405020304" pitchFamily="18" charset="0"/>
-            </a:endParaRPr>
-          </a:p>
-          <a:p>
-            <a:pPr marL="449580">
-              <a:lnSpc>
-                <a:spcPct val="107000"/>
-              </a:lnSpc>
-              <a:spcAft>
-                <a:spcPts val="800"/>
-              </a:spcAft>
-            </a:pPr>
-            <a:r>
-              <a:rPr lang="de-DE" dirty="0" smtClean="0">
-                <a:effectLst/>
-                <a:latin typeface="Calibri" panose="020F0502020204030204" pitchFamily="34" charset="0"/>
-                <a:ea typeface="Yu Mincho"/>
-                <a:cs typeface="Times New Roman" panose="02020603050405020304" pitchFamily="18" charset="0"/>
-              </a:rPr>
-              <a:t>Hierzu muss das Simulationsprogramms zum Erstellen und Testen von logischen Schaltungen erstellt werden. </a:t>
-            </a:r>
-            <a:br>
-              <a:rPr lang="de-DE" dirty="0" smtClean="0">
-                <a:effectLst/>
-                <a:latin typeface="Calibri" panose="020F0502020204030204" pitchFamily="34" charset="0"/>
-                <a:ea typeface="Yu Mincho"/>
-                <a:cs typeface="Times New Roman" panose="02020603050405020304" pitchFamily="18" charset="0"/>
-              </a:rPr>
-            </a:br>
-            <a:endParaRPr lang="de-DE" sz="1600" dirty="0" smtClean="0">
-              <a:effectLst/>
-              <a:latin typeface="Calibri" panose="020F0502020204030204" pitchFamily="34" charset="0"/>
-              <a:ea typeface="DengXian"/>
-              <a:cs typeface="Times New Roman" panose="02020603050405020304" pitchFamily="18" charset="0"/>
-            </a:endParaRPr>
-          </a:p>
-          <a:p>
-            <a:pPr marL="449580" indent="1270">
-              <a:lnSpc>
-                <a:spcPct val="107000"/>
-              </a:lnSpc>
-              <a:spcAft>
-                <a:spcPts val="800"/>
-              </a:spcAft>
-            </a:pPr>
-            <a:r>
-              <a:rPr lang="de-DE" dirty="0" smtClean="0">
-                <a:effectLst/>
-                <a:latin typeface="Calibri" panose="020F0502020204030204" pitchFamily="34" charset="0"/>
-                <a:ea typeface="Yu Mincho"/>
-                <a:cs typeface="Times New Roman" panose="02020603050405020304" pitchFamily="18" charset="0"/>
-              </a:rPr>
-              <a:t>Als Unterstützung dazu, das Projekt an mehreren Orten zu bearbeiten, wird das Programm „</a:t>
-            </a:r>
-            <a:r>
-              <a:rPr lang="de-DE" dirty="0" err="1" smtClean="0">
-                <a:effectLst/>
-                <a:latin typeface="Calibri" panose="020F0502020204030204" pitchFamily="34" charset="0"/>
-                <a:ea typeface="Yu Mincho"/>
-                <a:cs typeface="Times New Roman" panose="02020603050405020304" pitchFamily="18" charset="0"/>
-              </a:rPr>
-              <a:t>Github</a:t>
-            </a:r>
-            <a:r>
-              <a:rPr lang="de-DE" dirty="0" smtClean="0">
-                <a:effectLst/>
-                <a:latin typeface="Calibri" panose="020F0502020204030204" pitchFamily="34" charset="0"/>
-                <a:ea typeface="Yu Mincho"/>
-                <a:cs typeface="Times New Roman" panose="02020603050405020304" pitchFamily="18" charset="0"/>
-              </a:rPr>
-              <a:t> Desktop“ verwendet.</a:t>
-            </a:r>
-            <a:br>
-              <a:rPr lang="de-DE" dirty="0" smtClean="0">
-                <a:effectLst/>
-                <a:latin typeface="Calibri" panose="020F0502020204030204" pitchFamily="34" charset="0"/>
-                <a:ea typeface="Yu Mincho"/>
-                <a:cs typeface="Times New Roman" panose="02020603050405020304" pitchFamily="18" charset="0"/>
-              </a:rPr>
-            </a:br>
-            <a:endParaRPr lang="de-DE" sz="1600" dirty="0">
-              <a:effectLst/>
-              <a:latin typeface="Calibri" panose="020F0502020204030204" pitchFamily="34" charset="0"/>
-              <a:ea typeface="DengXian"/>
-              <a:cs typeface="Times New Roman" panose="02020603050405020304" pitchFamily="18" charset="0"/>
-            </a:endParaRPr>
-          </a:p>
-        </p:txBody>
-      </p:sp>
     </p:spTree>
     <p:extLst>
       <p:ext uri="{BB962C8B-B14F-4D97-AF65-F5344CB8AC3E}">
-        <p14:creationId xmlns:p14="http://schemas.microsoft.com/office/powerpoint/2010/main" val="2270602820"/>
+        <p14:creationId xmlns:p14="http://schemas.microsoft.com/office/powerpoint/2010/main" val="3668521372"/>
       </p:ext>
     </p:extLst>
   </p:cSld>
   <p:clrMapOvr>
     <a:masterClrMapping/>
   </p:clrMapOvr>
-  <p:timing>
-    <p:tnLst>
-      <p:par>
-        <p:cTn id="1" dur="indefinite" restart="never" nodeType="tmRoot"/>
-      </p:par>
-    </p:tnLst>
-  </p:timing>
 </p:sld>
 </file>
 
@@ -4502,6 +4469,93 @@
       </p:grpSpPr>
       <p:sp>
         <p:nvSpPr>
+          <p:cNvPr id="2" name="Title 1">
+            <a:extLst>
+              <a:ext uri="{FF2B5EF4-FFF2-40B4-BE49-F238E27FC236}">
+                <a16:creationId xmlns:a16="http://schemas.microsoft.com/office/drawing/2014/main" id="{2B4FA661-BA6B-41D9-8241-0527FEB12A61}"/>
+              </a:ext>
+            </a:extLst>
+          </p:cNvPr>
+          <p:cNvSpPr>
+            <a:spLocks noGrp="1"/>
+          </p:cNvSpPr>
+          <p:nvPr>
+            <p:ph type="title"/>
+          </p:nvPr>
+        </p:nvSpPr>
+        <p:spPr/>
+        <p:txBody>
+          <a:bodyPr/>
+          <a:lstStyle/>
+          <a:p>
+            <a:r>
+              <a:rPr lang="de-DE" dirty="0"/>
+              <a:t>Zeigen</a:t>
+            </a:r>
+            <a:r>
+              <a:rPr lang="en-US" dirty="0"/>
+              <a:t> des Programs</a:t>
+            </a:r>
+          </a:p>
+        </p:txBody>
+      </p:sp>
+      <p:sp>
+        <p:nvSpPr>
+          <p:cNvPr id="3" name="Content Placeholder 2">
+            <a:extLst>
+              <a:ext uri="{FF2B5EF4-FFF2-40B4-BE49-F238E27FC236}">
+                <a16:creationId xmlns:a16="http://schemas.microsoft.com/office/drawing/2014/main" id="{3399AC42-5E36-4A8F-BC6A-A776CBD90636}"/>
+              </a:ext>
+            </a:extLst>
+          </p:cNvPr>
+          <p:cNvSpPr>
+            <a:spLocks noGrp="1"/>
+          </p:cNvSpPr>
+          <p:nvPr>
+            <p:ph idx="1"/>
+          </p:nvPr>
+        </p:nvSpPr>
+        <p:spPr/>
+        <p:txBody>
+          <a:bodyPr/>
+          <a:lstStyle/>
+          <a:p>
+            <a:endParaRPr lang="en-US" dirty="0"/>
+          </a:p>
+        </p:txBody>
+      </p:sp>
+    </p:spTree>
+    <p:extLst>
+      <p:ext uri="{BB962C8B-B14F-4D97-AF65-F5344CB8AC3E}">
+        <p14:creationId xmlns:p14="http://schemas.microsoft.com/office/powerpoint/2010/main" val="1111223859"/>
+      </p:ext>
+    </p:extLst>
+  </p:cSld>
+  <p:clrMapOvr>
+    <a:masterClrMapping/>
+  </p:clrMapOvr>
+</p:sld>
+</file>
+
+<file path=ppt/slides/slide7.xml><?xml version="1.0" encoding="utf-8"?>
+<p:sld xmlns:a="http://schemas.openxmlformats.org/drawingml/2006/main" xmlns:r="http://schemas.openxmlformats.org/officeDocument/2006/relationships" xmlns:p="http://schemas.openxmlformats.org/presentationml/2006/main">
+  <p:cSld>
+    <p:spTree>
+      <p:nvGrpSpPr>
+        <p:cNvPr id="1" name=""/>
+        <p:cNvGrpSpPr/>
+        <p:nvPr/>
+      </p:nvGrpSpPr>
+      <p:grpSpPr>
+        <a:xfrm>
+          <a:off x="0" y="0"/>
+          <a:ext cx="0" cy="0"/>
+          <a:chOff x="0" y="0"/>
+          <a:chExt cx="0" cy="0"/>
+        </a:xfrm>
+      </p:grpSpPr>
+      <p:sp>
+        <p:nvSpPr>
           <p:cNvPr id="2" name="Titel 1"/>
           <p:cNvSpPr>
             <a:spLocks noGrp="1"/>
@@ -4521,10 +4575,9 @@
           <a:lstStyle/>
           <a:p>
             <a:r>
-              <a:rPr lang="de-DE" dirty="0" smtClean="0"/>
+              <a:rPr lang="de-DE" dirty="0"/>
               <a:t>Zeitplanung/Umsetzung</a:t>
             </a:r>
-            <a:endParaRPr lang="de-DE" dirty="0"/>
           </a:p>
         </p:txBody>
       </p:sp>
@@ -4554,12 +4607,48 @@
                 <a:tableStyleId>{284E427A-3D55-4303-BF80-6455036E1DE7}</a:tableStyleId>
               </a:tblPr>
               <a:tblGrid>
-                <a:gridCol w="2483941"/>
-                <a:gridCol w="682562"/>
-                <a:gridCol w="2540956"/>
-                <a:gridCol w="682562"/>
-                <a:gridCol w="2790534"/>
-                <a:gridCol w="986477"/>
+                <a:gridCol w="2483941">
+                  <a:extLst>
+                    <a:ext uri="{9D8B030D-6E8A-4147-A177-3AD203B41FA5}">
+                      <a16:colId xmlns:a16="http://schemas.microsoft.com/office/drawing/2014/main" val="20000"/>
+                    </a:ext>
+                  </a:extLst>
+                </a:gridCol>
+                <a:gridCol w="682562">
+                  <a:extLst>
+                    <a:ext uri="{9D8B030D-6E8A-4147-A177-3AD203B41FA5}">
+                      <a16:colId xmlns:a16="http://schemas.microsoft.com/office/drawing/2014/main" val="20001"/>
+                    </a:ext>
+                  </a:extLst>
+                </a:gridCol>
+                <a:gridCol w="2540956">
+                  <a:extLst>
+                    <a:ext uri="{9D8B030D-6E8A-4147-A177-3AD203B41FA5}">
+                      <a16:colId xmlns:a16="http://schemas.microsoft.com/office/drawing/2014/main" val="20002"/>
+                    </a:ext>
+                  </a:extLst>
+                </a:gridCol>
+                <a:gridCol w="682562">
+                  <a:extLst>
+                    <a:ext uri="{9D8B030D-6E8A-4147-A177-3AD203B41FA5}">
+                      <a16:colId xmlns:a16="http://schemas.microsoft.com/office/drawing/2014/main" val="20003"/>
+                    </a:ext>
+                  </a:extLst>
+                </a:gridCol>
+                <a:gridCol w="2790534">
+                  <a:extLst>
+                    <a:ext uri="{9D8B030D-6E8A-4147-A177-3AD203B41FA5}">
+                      <a16:colId xmlns:a16="http://schemas.microsoft.com/office/drawing/2014/main" val="20004"/>
+                    </a:ext>
+                  </a:extLst>
+                </a:gridCol>
+                <a:gridCol w="986477">
+                  <a:extLst>
+                    <a:ext uri="{9D8B030D-6E8A-4147-A177-3AD203B41FA5}">
+                      <a16:colId xmlns:a16="http://schemas.microsoft.com/office/drawing/2014/main" val="20005"/>
+                    </a:ext>
+                  </a:extLst>
+                </a:gridCol>
               </a:tblGrid>
               <a:tr h="411040">
                 <a:tc>
@@ -4576,7 +4665,7 @@
                         </a:spcAft>
                       </a:pPr>
                       <a:r>
-                        <a:rPr lang="de-DE" sz="1600" u="sng" dirty="0" err="1">
+                        <a:rPr lang="de-DE" sz="1600" u="sng" dirty="0">
                           <a:effectLst/>
                         </a:rPr>
                         <a:t>Wahlenmeier</a:t>
@@ -4608,22 +4697,16 @@
                         <a:rPr lang="de-DE" sz="1600" dirty="0">
                           <a:effectLst/>
                         </a:rPr>
-                        <a:t>Zeit </a:t>
+                        <a:t>Zeit in</a:t>
                       </a:r>
                       <a:r>
-                        <a:rPr lang="de-DE" sz="1600" dirty="0" smtClean="0">
-                          <a:effectLst/>
-                        </a:rPr>
-                        <a:t>in</a:t>
-                      </a:r>
-                      <a:r>
-                        <a:rPr lang="de-DE" sz="1600" baseline="0" dirty="0" smtClean="0">
+                        <a:rPr lang="de-DE" sz="1600" baseline="0" dirty="0">
                           <a:effectLst/>
                         </a:rPr>
                         <a:t> </a:t>
                       </a:r>
                       <a:r>
-                        <a:rPr lang="de-DE" sz="1600" dirty="0" smtClean="0">
+                        <a:rPr lang="de-DE" sz="1600" dirty="0">
                           <a:effectLst/>
                         </a:rPr>
                         <a:t>h</a:t>
@@ -4684,22 +4767,16 @@
                         <a:rPr lang="de-DE" sz="1600" dirty="0">
                           <a:effectLst/>
                         </a:rPr>
-                        <a:t>Zeit </a:t>
+                        <a:t>Zeit in</a:t>
                       </a:r>
                       <a:r>
-                        <a:rPr lang="de-DE" sz="1600" dirty="0" smtClean="0">
-                          <a:effectLst/>
-                        </a:rPr>
-                        <a:t>in</a:t>
-                      </a:r>
-                      <a:r>
-                        <a:rPr lang="de-DE" sz="1600" baseline="0" dirty="0" smtClean="0">
+                        <a:rPr lang="de-DE" sz="1600" baseline="0" dirty="0">
                           <a:effectLst/>
                         </a:rPr>
                         <a:t> </a:t>
                       </a:r>
                       <a:r>
-                        <a:rPr lang="de-DE" sz="1600" dirty="0" smtClean="0">
+                        <a:rPr lang="de-DE" sz="1600" dirty="0">
                           <a:effectLst/>
                         </a:rPr>
                         <a:t>h</a:t>
@@ -4728,12 +4805,12 @@
                         </a:spcAft>
                       </a:pPr>
                       <a:r>
-                        <a:rPr lang="de-DE" sz="1600" u="sng">
+                        <a:rPr lang="de-DE" sz="1600" u="sng" dirty="0">
                           <a:effectLst/>
                         </a:rPr>
                         <a:t>Heisser</a:t>
                       </a:r>
-                      <a:endParaRPr lang="de-DE" sz="1400">
+                      <a:endParaRPr lang="de-DE" sz="1400" dirty="0">
                         <a:effectLst/>
                         <a:latin typeface="Calibri" panose="020F0502020204030204" pitchFamily="34" charset="0"/>
                         <a:ea typeface="DengXian"/>
@@ -4757,12 +4834,12 @@
                         </a:spcAft>
                       </a:pPr>
                       <a:r>
-                        <a:rPr lang="de-DE" sz="1600">
+                        <a:rPr lang="de-DE" sz="1600" dirty="0">
                           <a:effectLst/>
                         </a:rPr>
                         <a:t>Zeit in h</a:t>
                       </a:r>
-                      <a:endParaRPr lang="de-DE" sz="1400">
+                      <a:endParaRPr lang="de-DE" sz="1400" dirty="0">
                         <a:effectLst/>
                         <a:latin typeface="Calibri" panose="020F0502020204030204" pitchFamily="34" charset="0"/>
                         <a:ea typeface="DengXian"/>
@@ -4772,6 +4849,11 @@
                   </a:txBody>
                   <a:tcPr marL="68580" marR="68580" marT="0" marB="0"/>
                 </a:tc>
+                <a:extLst>
+                  <a:ext uri="{0D108BD9-81ED-4DB2-BD59-A6C34878D82A}">
+                    <a16:rowId xmlns:a16="http://schemas.microsoft.com/office/drawing/2014/main" val="10000"/>
+                  </a:ext>
+                </a:extLst>
               </a:tr>
               <a:tr h="368206">
                 <a:tc>
@@ -4788,12 +4870,12 @@
                         </a:spcAft>
                       </a:pPr>
                       <a:r>
-                        <a:rPr lang="de-DE" sz="1600">
+                        <a:rPr lang="de-DE" sz="1600" dirty="0">
                           <a:effectLst/>
                         </a:rPr>
                         <a:t>Programm Organisation</a:t>
                       </a:r>
-                      <a:endParaRPr lang="de-DE" sz="1400">
+                      <a:endParaRPr lang="de-DE" sz="1400" dirty="0">
                         <a:effectLst/>
                         <a:latin typeface="Calibri" panose="020F0502020204030204" pitchFamily="34" charset="0"/>
                         <a:ea typeface="DengXian"/>
@@ -4817,12 +4899,12 @@
                         </a:spcAft>
                       </a:pPr>
                       <a:r>
-                        <a:rPr lang="de-DE" sz="1600">
+                        <a:rPr lang="de-DE" sz="1600" dirty="0">
                           <a:effectLst/>
                         </a:rPr>
                         <a:t>2</a:t>
                       </a:r>
-                      <a:endParaRPr lang="de-DE" sz="1400">
+                      <a:endParaRPr lang="de-DE" sz="1400" dirty="0">
                         <a:effectLst/>
                         <a:latin typeface="Calibri" panose="020F0502020204030204" pitchFamily="34" charset="0"/>
                         <a:ea typeface="DengXian"/>
@@ -4846,12 +4928,12 @@
                         </a:spcAft>
                       </a:pPr>
                       <a:r>
-                        <a:rPr lang="de-DE" sz="1600">
+                        <a:rPr lang="de-DE" sz="1600" dirty="0">
                           <a:effectLst/>
                         </a:rPr>
                         <a:t>Grafikdesign</a:t>
                       </a:r>
-                      <a:endParaRPr lang="de-DE" sz="1400">
+                      <a:endParaRPr lang="de-DE" sz="1400" dirty="0">
                         <a:effectLst/>
                         <a:latin typeface="Calibri" panose="020F0502020204030204" pitchFamily="34" charset="0"/>
                         <a:ea typeface="DengXian"/>
@@ -4875,12 +4957,12 @@
                         </a:spcAft>
                       </a:pPr>
                       <a:r>
-                        <a:rPr lang="de-DE" sz="1600">
+                        <a:rPr lang="de-DE" sz="1600" dirty="0">
                           <a:effectLst/>
                         </a:rPr>
                         <a:t>50</a:t>
                       </a:r>
-                      <a:endParaRPr lang="de-DE" sz="1400">
+                      <a:endParaRPr lang="de-DE" sz="1400" dirty="0">
                         <a:effectLst/>
                         <a:latin typeface="Calibri" panose="020F0502020204030204" pitchFamily="34" charset="0"/>
                         <a:ea typeface="DengXian"/>
@@ -4904,12 +4986,12 @@
                         </a:spcAft>
                       </a:pPr>
                       <a:r>
-                        <a:rPr lang="de-DE" sz="1600">
+                        <a:rPr lang="de-DE" sz="1600" dirty="0">
                           <a:effectLst/>
                         </a:rPr>
                         <a:t>Logik Bausteine in C#</a:t>
                       </a:r>
-                      <a:endParaRPr lang="de-DE" sz="1400">
+                      <a:endParaRPr lang="de-DE" sz="1400" dirty="0">
                         <a:effectLst/>
                         <a:latin typeface="Calibri" panose="020F0502020204030204" pitchFamily="34" charset="0"/>
                         <a:ea typeface="DengXian"/>
@@ -4933,12 +5015,12 @@
                         </a:spcAft>
                       </a:pPr>
                       <a:r>
-                        <a:rPr lang="de-DE" sz="1600">
+                        <a:rPr lang="de-DE" sz="1600" dirty="0">
                           <a:effectLst/>
                         </a:rPr>
                         <a:t>29</a:t>
                       </a:r>
-                      <a:endParaRPr lang="de-DE" sz="1400">
+                      <a:endParaRPr lang="de-DE" sz="1400" dirty="0">
                         <a:effectLst/>
                         <a:latin typeface="Calibri" panose="020F0502020204030204" pitchFamily="34" charset="0"/>
                         <a:ea typeface="DengXian"/>
@@ -4948,6 +5030,11 @@
                   </a:txBody>
                   <a:tcPr marL="68580" marR="68580" marT="0" marB="0"/>
                 </a:tc>
+                <a:extLst>
+                  <a:ext uri="{0D108BD9-81ED-4DB2-BD59-A6C34878D82A}">
+                    <a16:rowId xmlns:a16="http://schemas.microsoft.com/office/drawing/2014/main" val="10001"/>
+                  </a:ext>
+                </a:extLst>
               </a:tr>
               <a:tr h="368206">
                 <a:tc>
@@ -4993,12 +5080,12 @@
                         </a:spcAft>
                       </a:pPr>
                       <a:r>
-                        <a:rPr lang="de-DE" sz="1600">
+                        <a:rPr lang="de-DE" sz="1600" dirty="0">
                           <a:effectLst/>
                         </a:rPr>
                         <a:t>0</a:t>
                       </a:r>
-                      <a:endParaRPr lang="de-DE" sz="1400">
+                      <a:endParaRPr lang="de-DE" sz="1400" dirty="0">
                         <a:effectLst/>
                         <a:latin typeface="Calibri" panose="020F0502020204030204" pitchFamily="34" charset="0"/>
                         <a:ea typeface="DengXian"/>
@@ -5022,12 +5109,12 @@
                         </a:spcAft>
                       </a:pPr>
                       <a:r>
-                        <a:rPr lang="de-DE" sz="1600">
+                        <a:rPr lang="de-DE" sz="1600" dirty="0">
                           <a:effectLst/>
                         </a:rPr>
                         <a:t>Tastatur Kürzel</a:t>
                       </a:r>
-                      <a:endParaRPr lang="de-DE" sz="1400">
+                      <a:endParaRPr lang="de-DE" sz="1400" dirty="0">
                         <a:effectLst/>
                         <a:latin typeface="Calibri" panose="020F0502020204030204" pitchFamily="34" charset="0"/>
                         <a:ea typeface="DengXian"/>
@@ -5051,12 +5138,12 @@
                         </a:spcAft>
                       </a:pPr>
                       <a:r>
-                        <a:rPr lang="de-DE" sz="1600">
+                        <a:rPr lang="de-DE" sz="1600" dirty="0">
                           <a:effectLst/>
                         </a:rPr>
                         <a:t>0</a:t>
                       </a:r>
-                      <a:endParaRPr lang="de-DE" sz="1400">
+                      <a:endParaRPr lang="de-DE" sz="1400" dirty="0">
                         <a:effectLst/>
                         <a:latin typeface="Calibri" panose="020F0502020204030204" pitchFamily="34" charset="0"/>
                         <a:ea typeface="DengXian"/>
@@ -5080,12 +5167,12 @@
                         </a:spcAft>
                       </a:pPr>
                       <a:r>
-                        <a:rPr lang="de-DE" sz="1600">
+                        <a:rPr lang="de-DE" sz="1600" dirty="0">
                           <a:effectLst/>
                         </a:rPr>
                         <a:t>Verbindungslinien</a:t>
                       </a:r>
-                      <a:endParaRPr lang="de-DE" sz="1400">
+                      <a:endParaRPr lang="de-DE" sz="1400" dirty="0">
                         <a:effectLst/>
                         <a:latin typeface="Calibri" panose="020F0502020204030204" pitchFamily="34" charset="0"/>
                         <a:ea typeface="DengXian"/>
@@ -5109,12 +5196,12 @@
                         </a:spcAft>
                       </a:pPr>
                       <a:r>
-                        <a:rPr lang="de-DE" sz="1600">
+                        <a:rPr lang="de-DE" sz="1600" dirty="0">
                           <a:effectLst/>
                         </a:rPr>
                         <a:t>32</a:t>
                       </a:r>
-                      <a:endParaRPr lang="de-DE" sz="1400">
+                      <a:endParaRPr lang="de-DE" sz="1400" dirty="0">
                         <a:effectLst/>
                         <a:latin typeface="Calibri" panose="020F0502020204030204" pitchFamily="34" charset="0"/>
                         <a:ea typeface="DengXian"/>
@@ -5124,6 +5211,11 @@
                   </a:txBody>
                   <a:tcPr marL="68580" marR="68580" marT="0" marB="0"/>
                 </a:tc>
+                <a:extLst>
+                  <a:ext uri="{0D108BD9-81ED-4DB2-BD59-A6C34878D82A}">
+                    <a16:rowId xmlns:a16="http://schemas.microsoft.com/office/drawing/2014/main" val="10002"/>
+                  </a:ext>
+                </a:extLst>
               </a:tr>
               <a:tr h="736412">
                 <a:tc>
@@ -5140,12 +5232,12 @@
                         </a:spcAft>
                       </a:pPr>
                       <a:r>
-                        <a:rPr lang="de-DE" sz="1600">
+                        <a:rPr lang="de-DE" sz="1600" dirty="0">
                           <a:effectLst/>
                         </a:rPr>
                         <a:t>Schnittstelle für Mikrokotroller zu C#</a:t>
                       </a:r>
-                      <a:endParaRPr lang="de-DE" sz="1400">
+                      <a:endParaRPr lang="de-DE" sz="1400" dirty="0">
                         <a:effectLst/>
                         <a:latin typeface="Calibri" panose="020F0502020204030204" pitchFamily="34" charset="0"/>
                         <a:ea typeface="DengXian"/>
@@ -5169,12 +5261,12 @@
                         </a:spcAft>
                       </a:pPr>
                       <a:r>
-                        <a:rPr lang="de-DE" sz="1600">
+                        <a:rPr lang="de-DE" sz="1600" dirty="0">
                           <a:effectLst/>
                         </a:rPr>
                         <a:t>0</a:t>
                       </a:r>
-                      <a:endParaRPr lang="de-DE" sz="1400">
+                      <a:endParaRPr lang="de-DE" sz="1400" dirty="0">
                         <a:effectLst/>
                         <a:latin typeface="Calibri" panose="020F0502020204030204" pitchFamily="34" charset="0"/>
                         <a:ea typeface="DengXian"/>
@@ -5198,12 +5290,12 @@
                         </a:spcAft>
                       </a:pPr>
                       <a:r>
-                        <a:rPr lang="de-DE" sz="1600">
+                        <a:rPr lang="de-DE" sz="1600" dirty="0">
                           <a:effectLst/>
                         </a:rPr>
                         <a:t>Englische und deutsche Bedienelemente</a:t>
                       </a:r>
-                      <a:endParaRPr lang="de-DE" sz="1400">
+                      <a:endParaRPr lang="de-DE" sz="1400" dirty="0">
                         <a:effectLst/>
                         <a:latin typeface="Calibri" panose="020F0502020204030204" pitchFamily="34" charset="0"/>
                         <a:ea typeface="DengXian"/>
@@ -5227,12 +5319,12 @@
                         </a:spcAft>
                       </a:pPr>
                       <a:r>
-                        <a:rPr lang="de-DE" sz="1600">
+                        <a:rPr lang="de-DE" sz="1600" dirty="0">
                           <a:effectLst/>
                         </a:rPr>
                         <a:t>0</a:t>
                       </a:r>
-                      <a:endParaRPr lang="de-DE" sz="1400">
+                      <a:endParaRPr lang="de-DE" sz="1400" dirty="0">
                         <a:effectLst/>
                         <a:latin typeface="Calibri" panose="020F0502020204030204" pitchFamily="34" charset="0"/>
                         <a:ea typeface="DengXian"/>
@@ -5256,12 +5348,12 @@
                         </a:spcAft>
                       </a:pPr>
                       <a:r>
-                        <a:rPr lang="de-DE" sz="1600">
+                        <a:rPr lang="de-DE" sz="1600" dirty="0">
                           <a:effectLst/>
                         </a:rPr>
                         <a:t>Abspeichern und öffnen von Programm </a:t>
                       </a:r>
-                      <a:endParaRPr lang="de-DE" sz="1400">
+                      <a:endParaRPr lang="de-DE" sz="1400" dirty="0">
                         <a:effectLst/>
                         <a:latin typeface="Calibri" panose="020F0502020204030204" pitchFamily="34" charset="0"/>
                         <a:ea typeface="DengXian"/>
@@ -5285,12 +5377,12 @@
                         </a:spcAft>
                       </a:pPr>
                       <a:r>
-                        <a:rPr lang="de-DE" sz="1600">
+                        <a:rPr lang="de-DE" sz="1600" dirty="0">
                           <a:effectLst/>
                         </a:rPr>
                         <a:t>28</a:t>
                       </a:r>
-                      <a:endParaRPr lang="de-DE" sz="1400">
+                      <a:endParaRPr lang="de-DE" sz="1400" dirty="0">
                         <a:effectLst/>
                         <a:latin typeface="Calibri" panose="020F0502020204030204" pitchFamily="34" charset="0"/>
                         <a:ea typeface="DengXian"/>
@@ -5300,6 +5392,11 @@
                   </a:txBody>
                   <a:tcPr marL="68580" marR="68580" marT="0" marB="0"/>
                 </a:tc>
+                <a:extLst>
+                  <a:ext uri="{0D108BD9-81ED-4DB2-BD59-A6C34878D82A}">
+                    <a16:rowId xmlns:a16="http://schemas.microsoft.com/office/drawing/2014/main" val="10003"/>
+                  </a:ext>
+                </a:extLst>
               </a:tr>
               <a:tr h="368206">
                 <a:tc>
@@ -5316,12 +5413,12 @@
                         </a:spcAft>
                       </a:pPr>
                       <a:r>
-                        <a:rPr lang="de-DE" sz="1600">
+                        <a:rPr lang="de-DE" sz="1600" dirty="0">
                           <a:effectLst/>
                         </a:rPr>
                         <a:t>Drag &amp; Drop</a:t>
                       </a:r>
-                      <a:endParaRPr lang="de-DE" sz="1400">
+                      <a:endParaRPr lang="de-DE" sz="1400" dirty="0">
                         <a:effectLst/>
                         <a:latin typeface="Calibri" panose="020F0502020204030204" pitchFamily="34" charset="0"/>
                         <a:ea typeface="DengXian"/>
@@ -5345,12 +5442,12 @@
                         </a:spcAft>
                       </a:pPr>
                       <a:r>
-                        <a:rPr lang="de-DE" sz="1600">
+                        <a:rPr lang="de-DE" sz="1600" dirty="0">
                           <a:effectLst/>
                         </a:rPr>
                         <a:t>54</a:t>
                       </a:r>
-                      <a:endParaRPr lang="de-DE" sz="1400">
+                      <a:endParaRPr lang="de-DE" sz="1400" dirty="0">
                         <a:effectLst/>
                         <a:latin typeface="Calibri" panose="020F0502020204030204" pitchFamily="34" charset="0"/>
                         <a:ea typeface="DengXian"/>
@@ -5374,12 +5471,12 @@
                         </a:spcAft>
                       </a:pPr>
                       <a:r>
-                        <a:rPr lang="de-DE" sz="1600">
+                        <a:rPr lang="de-DE" sz="1600" dirty="0">
                           <a:effectLst/>
                         </a:rPr>
                         <a:t> </a:t>
                       </a:r>
-                      <a:endParaRPr lang="de-DE" sz="1400">
+                      <a:endParaRPr lang="de-DE" sz="1400" dirty="0">
                         <a:effectLst/>
                         <a:latin typeface="Calibri" panose="020F0502020204030204" pitchFamily="34" charset="0"/>
                         <a:ea typeface="DengXian"/>
@@ -5403,12 +5500,12 @@
                         </a:spcAft>
                       </a:pPr>
                       <a:r>
-                        <a:rPr lang="de-DE" sz="1600">
+                        <a:rPr lang="de-DE" sz="1600" dirty="0">
                           <a:effectLst/>
                         </a:rPr>
                         <a:t> </a:t>
                       </a:r>
-                      <a:endParaRPr lang="de-DE" sz="1400">
+                      <a:endParaRPr lang="de-DE" sz="1400" dirty="0">
                         <a:effectLst/>
                         <a:latin typeface="Calibri" panose="020F0502020204030204" pitchFamily="34" charset="0"/>
                         <a:ea typeface="DengXian"/>
@@ -5432,12 +5529,12 @@
                         </a:spcAft>
                       </a:pPr>
                       <a:r>
-                        <a:rPr lang="de-DE" sz="1600">
+                        <a:rPr lang="de-DE" sz="1600" dirty="0">
                           <a:effectLst/>
                         </a:rPr>
                         <a:t>Fleißarbeit</a:t>
                       </a:r>
-                      <a:endParaRPr lang="de-DE" sz="1400">
+                      <a:endParaRPr lang="de-DE" sz="1400" dirty="0">
                         <a:effectLst/>
                         <a:latin typeface="Calibri" panose="020F0502020204030204" pitchFamily="34" charset="0"/>
                         <a:ea typeface="DengXian"/>
@@ -5461,12 +5558,12 @@
                         </a:spcAft>
                       </a:pPr>
                       <a:r>
-                        <a:rPr lang="de-DE" sz="1600">
+                        <a:rPr lang="de-DE" sz="1600" dirty="0">
                           <a:effectLst/>
                         </a:rPr>
                         <a:t>35</a:t>
                       </a:r>
-                      <a:endParaRPr lang="de-DE" sz="1400">
+                      <a:endParaRPr lang="de-DE" sz="1400" dirty="0">
                         <a:effectLst/>
                         <a:latin typeface="Calibri" panose="020F0502020204030204" pitchFamily="34" charset="0"/>
                         <a:ea typeface="DengXian"/>
@@ -5476,6 +5573,11 @@
                   </a:txBody>
                   <a:tcPr marL="68580" marR="68580" marT="0" marB="0"/>
                 </a:tc>
+                <a:extLst>
+                  <a:ext uri="{0D108BD9-81ED-4DB2-BD59-A6C34878D82A}">
+                    <a16:rowId xmlns:a16="http://schemas.microsoft.com/office/drawing/2014/main" val="10004"/>
+                  </a:ext>
+                </a:extLst>
               </a:tr>
               <a:tr h="736412">
                 <a:tc>
@@ -5492,12 +5594,12 @@
                         </a:spcAft>
                       </a:pPr>
                       <a:r>
-                        <a:rPr lang="de-DE" sz="1600">
+                        <a:rPr lang="de-DE" sz="1600" dirty="0">
                           <a:effectLst/>
                         </a:rPr>
                         <a:t>Löschen / zoomen /</a:t>
                       </a:r>
-                      <a:endParaRPr lang="de-DE" sz="1400">
+                      <a:endParaRPr lang="de-DE" sz="1400" dirty="0">
                         <a:effectLst/>
                       </a:endParaRPr>
                     </a:p>
@@ -5511,12 +5613,12 @@
                         </a:spcAft>
                       </a:pPr>
                       <a:r>
-                        <a:rPr lang="de-DE" sz="1600">
+                        <a:rPr lang="de-DE" sz="1600" dirty="0">
                           <a:effectLst/>
                         </a:rPr>
                         <a:t>Toolbox</a:t>
                       </a:r>
-                      <a:endParaRPr lang="de-DE" sz="1400">
+                      <a:endParaRPr lang="de-DE" sz="1400" dirty="0">
                         <a:effectLst/>
                         <a:latin typeface="Calibri" panose="020F0502020204030204" pitchFamily="34" charset="0"/>
                         <a:ea typeface="DengXian"/>
@@ -5540,12 +5642,12 @@
                         </a:spcAft>
                       </a:pPr>
                       <a:r>
-                        <a:rPr lang="de-DE" sz="1600">
+                        <a:rPr lang="de-DE" sz="1600" dirty="0">
                           <a:effectLst/>
                         </a:rPr>
                         <a:t>8</a:t>
                       </a:r>
-                      <a:endParaRPr lang="de-DE" sz="1400">
+                      <a:endParaRPr lang="de-DE" sz="1400" dirty="0">
                         <a:effectLst/>
                         <a:latin typeface="Calibri" panose="020F0502020204030204" pitchFamily="34" charset="0"/>
                         <a:ea typeface="DengXian"/>
@@ -5569,12 +5671,12 @@
                         </a:spcAft>
                       </a:pPr>
                       <a:r>
-                        <a:rPr lang="de-DE" sz="1600">
+                        <a:rPr lang="de-DE" sz="1600" dirty="0">
                           <a:effectLst/>
                         </a:rPr>
                         <a:t> </a:t>
                       </a:r>
-                      <a:endParaRPr lang="de-DE" sz="1400">
+                      <a:endParaRPr lang="de-DE" sz="1400" dirty="0">
                         <a:effectLst/>
                         <a:latin typeface="Calibri" panose="020F0502020204030204" pitchFamily="34" charset="0"/>
                         <a:ea typeface="DengXian"/>
@@ -5598,12 +5700,12 @@
                         </a:spcAft>
                       </a:pPr>
                       <a:r>
-                        <a:rPr lang="de-DE" sz="1600">
+                        <a:rPr lang="de-DE" sz="1600" dirty="0">
                           <a:effectLst/>
                         </a:rPr>
                         <a:t> </a:t>
                       </a:r>
-                      <a:endParaRPr lang="de-DE" sz="1400">
+                      <a:endParaRPr lang="de-DE" sz="1400" dirty="0">
                         <a:effectLst/>
                         <a:latin typeface="Calibri" panose="020F0502020204030204" pitchFamily="34" charset="0"/>
                         <a:ea typeface="DengXian"/>
@@ -5627,12 +5729,12 @@
                         </a:spcAft>
                       </a:pPr>
                       <a:r>
-                        <a:rPr lang="de-DE" sz="1600">
+                        <a:rPr lang="de-DE" sz="1600" dirty="0">
                           <a:effectLst/>
                         </a:rPr>
                         <a:t> </a:t>
                       </a:r>
-                      <a:endParaRPr lang="de-DE" sz="1400">
+                      <a:endParaRPr lang="de-DE" sz="1400" dirty="0">
                         <a:effectLst/>
                         <a:latin typeface="Calibri" panose="020F0502020204030204" pitchFamily="34" charset="0"/>
                         <a:ea typeface="DengXian"/>
@@ -5656,12 +5758,12 @@
                         </a:spcAft>
                       </a:pPr>
                       <a:r>
-                        <a:rPr lang="de-DE" sz="1600">
+                        <a:rPr lang="de-DE" sz="1600" dirty="0">
                           <a:effectLst/>
                         </a:rPr>
                         <a:t> </a:t>
                       </a:r>
-                      <a:endParaRPr lang="de-DE" sz="1400">
+                      <a:endParaRPr lang="de-DE" sz="1400" dirty="0">
                         <a:effectLst/>
                         <a:latin typeface="Calibri" panose="020F0502020204030204" pitchFamily="34" charset="0"/>
                         <a:ea typeface="DengXian"/>
@@ -5671,6 +5773,11 @@
                   </a:txBody>
                   <a:tcPr marL="68580" marR="68580" marT="0" marB="0"/>
                 </a:tc>
+                <a:extLst>
+                  <a:ext uri="{0D108BD9-81ED-4DB2-BD59-A6C34878D82A}">
+                    <a16:rowId xmlns:a16="http://schemas.microsoft.com/office/drawing/2014/main" val="10005"/>
+                  </a:ext>
+                </a:extLst>
               </a:tr>
               <a:tr h="368206">
                 <a:tc>
@@ -5690,12 +5797,12 @@
                         </a:tabLst>
                       </a:pPr>
                       <a:r>
-                        <a:rPr lang="de-DE" sz="1600">
+                        <a:rPr lang="de-DE" sz="1600" dirty="0">
                           <a:effectLst/>
                         </a:rPr>
                         <a:t>Fehlerdiagnose	</a:t>
                       </a:r>
-                      <a:endParaRPr lang="de-DE" sz="1400">
+                      <a:endParaRPr lang="de-DE" sz="1400" dirty="0">
                         <a:effectLst/>
                         <a:latin typeface="Calibri" panose="020F0502020204030204" pitchFamily="34" charset="0"/>
                         <a:ea typeface="DengXian"/>
@@ -5719,12 +5826,12 @@
                         </a:spcAft>
                       </a:pPr>
                       <a:r>
-                        <a:rPr lang="de-DE" sz="1600">
+                        <a:rPr lang="de-DE" sz="1600" dirty="0">
                           <a:effectLst/>
                         </a:rPr>
                         <a:t>24</a:t>
                       </a:r>
-                      <a:endParaRPr lang="de-DE" sz="1400">
+                      <a:endParaRPr lang="de-DE" sz="1400" dirty="0">
                         <a:effectLst/>
                         <a:latin typeface="Calibri" panose="020F0502020204030204" pitchFamily="34" charset="0"/>
                         <a:ea typeface="DengXian"/>
@@ -5748,12 +5855,12 @@
                         </a:spcAft>
                       </a:pPr>
                       <a:r>
-                        <a:rPr lang="de-DE" sz="1600">
+                        <a:rPr lang="de-DE" sz="1600" dirty="0">
                           <a:effectLst/>
                         </a:rPr>
                         <a:t>Fehlerdiagnose</a:t>
                       </a:r>
-                      <a:endParaRPr lang="de-DE" sz="1400">
+                      <a:endParaRPr lang="de-DE" sz="1400" dirty="0">
                         <a:effectLst/>
                         <a:latin typeface="Calibri" panose="020F0502020204030204" pitchFamily="34" charset="0"/>
                         <a:ea typeface="DengXian"/>
@@ -5777,12 +5884,12 @@
                         </a:spcAft>
                       </a:pPr>
                       <a:r>
-                        <a:rPr lang="de-DE" sz="1600">
+                        <a:rPr lang="de-DE" sz="1600" dirty="0">
                           <a:effectLst/>
                         </a:rPr>
                         <a:t>11</a:t>
                       </a:r>
-                      <a:endParaRPr lang="de-DE" sz="1400">
+                      <a:endParaRPr lang="de-DE" sz="1400" dirty="0">
                         <a:effectLst/>
                         <a:latin typeface="Calibri" panose="020F0502020204030204" pitchFamily="34" charset="0"/>
                         <a:ea typeface="DengXian"/>
@@ -5806,18 +5913,18 @@
                         </a:spcAft>
                       </a:pPr>
                       <a:r>
-                        <a:rPr lang="de-DE" sz="1600">
+                        <a:rPr lang="de-DE" sz="1600" dirty="0">
                           <a:effectLst/>
                         </a:rPr>
                         <a:t>Fehlerdiagnose/</a:t>
                       </a:r>
                       <a:r>
-                        <a:rPr lang="en-US" sz="1600">
+                        <a:rPr lang="en-US" sz="1600" dirty="0">
                           <a:effectLst/>
                         </a:rPr>
                         <a:t>Cleanup</a:t>
                       </a:r>
-                      <a:endParaRPr lang="de-DE" sz="1400">
+                      <a:endParaRPr lang="de-DE" sz="1400" dirty="0">
                         <a:effectLst/>
                         <a:latin typeface="Calibri" panose="020F0502020204030204" pitchFamily="34" charset="0"/>
                         <a:ea typeface="DengXian"/>
@@ -5841,12 +5948,12 @@
                         </a:spcAft>
                       </a:pPr>
                       <a:r>
-                        <a:rPr lang="de-DE" sz="1600">
+                        <a:rPr lang="de-DE" sz="1600" dirty="0">
                           <a:effectLst/>
                         </a:rPr>
                         <a:t>53</a:t>
                       </a:r>
-                      <a:endParaRPr lang="de-DE" sz="1400">
+                      <a:endParaRPr lang="de-DE" sz="1400" dirty="0">
                         <a:effectLst/>
                         <a:latin typeface="Calibri" panose="020F0502020204030204" pitchFamily="34" charset="0"/>
                         <a:ea typeface="DengXian"/>
@@ -5856,6 +5963,11 @@
                   </a:txBody>
                   <a:tcPr marL="68580" marR="68580" marT="0" marB="0"/>
                 </a:tc>
+                <a:extLst>
+                  <a:ext uri="{0D108BD9-81ED-4DB2-BD59-A6C34878D82A}">
+                    <a16:rowId xmlns:a16="http://schemas.microsoft.com/office/drawing/2014/main" val="10006"/>
+                  </a:ext>
+                </a:extLst>
               </a:tr>
               <a:tr h="368206">
                 <a:tc>
@@ -5872,12 +5984,12 @@
                         </a:spcAft>
                       </a:pPr>
                       <a:r>
-                        <a:rPr lang="de-DE" sz="1600">
+                        <a:rPr lang="de-DE" sz="1600" dirty="0">
                           <a:effectLst/>
                         </a:rPr>
                         <a:t>Lern Zeit</a:t>
                       </a:r>
-                      <a:endParaRPr lang="de-DE" sz="1400">
+                      <a:endParaRPr lang="de-DE" sz="1400" dirty="0">
                         <a:effectLst/>
                         <a:latin typeface="Calibri" panose="020F0502020204030204" pitchFamily="34" charset="0"/>
                         <a:ea typeface="DengXian"/>
@@ -5901,12 +6013,12 @@
                         </a:spcAft>
                       </a:pPr>
                       <a:r>
-                        <a:rPr lang="de-DE" sz="1600">
+                        <a:rPr lang="de-DE" sz="1600" dirty="0">
                           <a:effectLst/>
                         </a:rPr>
                         <a:t>26</a:t>
                       </a:r>
-                      <a:endParaRPr lang="de-DE" sz="1400">
+                      <a:endParaRPr lang="de-DE" sz="1400" dirty="0">
                         <a:effectLst/>
                         <a:latin typeface="Calibri" panose="020F0502020204030204" pitchFamily="34" charset="0"/>
                         <a:ea typeface="DengXian"/>
@@ -5930,12 +6042,12 @@
                         </a:spcAft>
                       </a:pPr>
                       <a:r>
-                        <a:rPr lang="de-DE" sz="1600">
+                        <a:rPr lang="de-DE" sz="1600" dirty="0">
                           <a:effectLst/>
                         </a:rPr>
                         <a:t>Lern Zeit</a:t>
                       </a:r>
-                      <a:endParaRPr lang="de-DE" sz="1400">
+                      <a:endParaRPr lang="de-DE" sz="1400" dirty="0">
                         <a:effectLst/>
                         <a:latin typeface="Calibri" panose="020F0502020204030204" pitchFamily="34" charset="0"/>
                         <a:ea typeface="DengXian"/>
@@ -5959,12 +6071,12 @@
                         </a:spcAft>
                       </a:pPr>
                       <a:r>
-                        <a:rPr lang="de-DE" sz="1600">
+                        <a:rPr lang="de-DE" sz="1600" dirty="0">
                           <a:effectLst/>
                         </a:rPr>
                         <a:t>10</a:t>
                       </a:r>
-                      <a:endParaRPr lang="de-DE" sz="1400">
+                      <a:endParaRPr lang="de-DE" sz="1400" dirty="0">
                         <a:effectLst/>
                         <a:latin typeface="Calibri" panose="020F0502020204030204" pitchFamily="34" charset="0"/>
                         <a:ea typeface="DengXian"/>
@@ -5988,12 +6100,12 @@
                         </a:spcAft>
                       </a:pPr>
                       <a:r>
-                        <a:rPr lang="de-DE" sz="1600">
+                        <a:rPr lang="de-DE" sz="1600" dirty="0">
                           <a:effectLst/>
                         </a:rPr>
                         <a:t>Lern Zeit</a:t>
                       </a:r>
-                      <a:endParaRPr lang="de-DE" sz="1400">
+                      <a:endParaRPr lang="de-DE" sz="1400" dirty="0">
                         <a:effectLst/>
                         <a:latin typeface="Calibri" panose="020F0502020204030204" pitchFamily="34" charset="0"/>
                         <a:ea typeface="DengXian"/>
@@ -6017,12 +6129,12 @@
                         </a:spcAft>
                       </a:pPr>
                       <a:r>
-                        <a:rPr lang="de-DE" sz="1600">
+                        <a:rPr lang="de-DE" sz="1600" dirty="0">
                           <a:effectLst/>
                         </a:rPr>
                         <a:t>54</a:t>
                       </a:r>
-                      <a:endParaRPr lang="de-DE" sz="1400">
+                      <a:endParaRPr lang="de-DE" sz="1400" dirty="0">
                         <a:effectLst/>
                         <a:latin typeface="Calibri" panose="020F0502020204030204" pitchFamily="34" charset="0"/>
                         <a:ea typeface="DengXian"/>
@@ -6032,6 +6144,11 @@
                   </a:txBody>
                   <a:tcPr marL="68580" marR="68580" marT="0" marB="0"/>
                 </a:tc>
+                <a:extLst>
+                  <a:ext uri="{0D108BD9-81ED-4DB2-BD59-A6C34878D82A}">
+                    <a16:rowId xmlns:a16="http://schemas.microsoft.com/office/drawing/2014/main" val="10007"/>
+                  </a:ext>
+                </a:extLst>
               </a:tr>
               <a:tr h="368206">
                 <a:tc>
@@ -6048,12 +6165,12 @@
                         </a:spcAft>
                       </a:pPr>
                       <a:r>
-                        <a:rPr lang="de-DE" sz="1600">
+                        <a:rPr lang="de-DE" sz="1600" dirty="0">
                           <a:effectLst/>
                         </a:rPr>
                         <a:t>PowerPoint</a:t>
                       </a:r>
-                      <a:endParaRPr lang="de-DE" sz="1400">
+                      <a:endParaRPr lang="de-DE" sz="1400" dirty="0">
                         <a:effectLst/>
                         <a:latin typeface="Calibri" panose="020F0502020204030204" pitchFamily="34" charset="0"/>
                         <a:ea typeface="DengXian"/>
@@ -6077,12 +6194,12 @@
                         </a:spcAft>
                       </a:pPr>
                       <a:r>
-                        <a:rPr lang="de-DE" sz="1600">
+                        <a:rPr lang="de-DE" sz="1600" dirty="0">
                           <a:effectLst/>
                         </a:rPr>
                         <a:t>2</a:t>
                       </a:r>
-                      <a:endParaRPr lang="de-DE" sz="1400">
+                      <a:endParaRPr lang="de-DE" sz="1400" dirty="0">
                         <a:effectLst/>
                         <a:latin typeface="Calibri" panose="020F0502020204030204" pitchFamily="34" charset="0"/>
                         <a:ea typeface="DengXian"/>
@@ -6106,12 +6223,12 @@
                         </a:spcAft>
                       </a:pPr>
                       <a:r>
-                        <a:rPr lang="de-DE" sz="1600">
+                        <a:rPr lang="de-DE" sz="1600" dirty="0">
                           <a:effectLst/>
                         </a:rPr>
                         <a:t>PowerPoint</a:t>
                       </a:r>
-                      <a:endParaRPr lang="de-DE" sz="1400">
+                      <a:endParaRPr lang="de-DE" sz="1400" dirty="0">
                         <a:effectLst/>
                         <a:latin typeface="Calibri" panose="020F0502020204030204" pitchFamily="34" charset="0"/>
                         <a:ea typeface="DengXian"/>
@@ -6135,12 +6252,12 @@
                         </a:spcAft>
                       </a:pPr>
                       <a:r>
-                        <a:rPr lang="de-DE" sz="1600">
+                        <a:rPr lang="de-DE" sz="1600" dirty="0">
                           <a:effectLst/>
                         </a:rPr>
                         <a:t>2</a:t>
                       </a:r>
-                      <a:endParaRPr lang="de-DE" sz="1400">
+                      <a:endParaRPr lang="de-DE" sz="1400" dirty="0">
                         <a:effectLst/>
                         <a:latin typeface="Calibri" panose="020F0502020204030204" pitchFamily="34" charset="0"/>
                         <a:ea typeface="DengXian"/>
@@ -6164,12 +6281,12 @@
                         </a:spcAft>
                       </a:pPr>
                       <a:r>
-                        <a:rPr lang="de-DE" sz="1600">
+                        <a:rPr lang="de-DE" sz="1600" dirty="0">
                           <a:effectLst/>
                         </a:rPr>
                         <a:t>PowerPoint</a:t>
                       </a:r>
-                      <a:endParaRPr lang="de-DE" sz="1400">
+                      <a:endParaRPr lang="de-DE" sz="1400" dirty="0">
                         <a:effectLst/>
                         <a:latin typeface="Calibri" panose="020F0502020204030204" pitchFamily="34" charset="0"/>
                         <a:ea typeface="DengXian"/>
@@ -6193,12 +6310,12 @@
                         </a:spcAft>
                       </a:pPr>
                       <a:r>
-                        <a:rPr lang="de-DE" sz="1600">
+                        <a:rPr lang="de-DE" sz="1600" dirty="0">
                           <a:effectLst/>
                         </a:rPr>
                         <a:t>2</a:t>
                       </a:r>
-                      <a:endParaRPr lang="de-DE" sz="1400">
+                      <a:endParaRPr lang="de-DE" sz="1400" dirty="0">
                         <a:effectLst/>
                         <a:latin typeface="Calibri" panose="020F0502020204030204" pitchFamily="34" charset="0"/>
                         <a:ea typeface="DengXian"/>
@@ -6208,6 +6325,11 @@
                   </a:txBody>
                   <a:tcPr marL="68580" marR="68580" marT="0" marB="0"/>
                 </a:tc>
+                <a:extLst>
+                  <a:ext uri="{0D108BD9-81ED-4DB2-BD59-A6C34878D82A}">
+                    <a16:rowId xmlns:a16="http://schemas.microsoft.com/office/drawing/2014/main" val="10008"/>
+                  </a:ext>
+                </a:extLst>
               </a:tr>
               <a:tr h="101549">
                 <a:tc>
@@ -6224,12 +6346,12 @@
                         </a:spcAft>
                       </a:pPr>
                       <a:r>
-                        <a:rPr lang="de-DE" sz="400">
+                        <a:rPr lang="de-DE" sz="400" dirty="0">
                           <a:effectLst/>
                         </a:rPr>
                         <a:t> </a:t>
                       </a:r>
-                      <a:endParaRPr lang="de-DE" sz="1400">
+                      <a:endParaRPr lang="de-DE" sz="1400" dirty="0">
                         <a:effectLst/>
                         <a:latin typeface="Calibri" panose="020F0502020204030204" pitchFamily="34" charset="0"/>
                         <a:ea typeface="DengXian"/>
@@ -6253,12 +6375,12 @@
                         </a:spcAft>
                       </a:pPr>
                       <a:r>
-                        <a:rPr lang="de-DE" sz="400">
+                        <a:rPr lang="de-DE" sz="400" dirty="0">
                           <a:effectLst/>
                         </a:rPr>
                         <a:t> </a:t>
                       </a:r>
-                      <a:endParaRPr lang="de-DE" sz="1400">
+                      <a:endParaRPr lang="de-DE" sz="1400" dirty="0">
                         <a:effectLst/>
                         <a:latin typeface="Calibri" panose="020F0502020204030204" pitchFamily="34" charset="0"/>
                         <a:ea typeface="DengXian"/>
@@ -6282,12 +6404,12 @@
                         </a:spcAft>
                       </a:pPr>
                       <a:r>
-                        <a:rPr lang="de-DE" sz="400">
+                        <a:rPr lang="de-DE" sz="400" dirty="0">
                           <a:effectLst/>
                         </a:rPr>
                         <a:t> </a:t>
                       </a:r>
-                      <a:endParaRPr lang="de-DE" sz="1400">
+                      <a:endParaRPr lang="de-DE" sz="1400" dirty="0">
                         <a:effectLst/>
                         <a:latin typeface="Calibri" panose="020F0502020204030204" pitchFamily="34" charset="0"/>
                         <a:ea typeface="DengXian"/>
@@ -6311,12 +6433,12 @@
                         </a:spcAft>
                       </a:pPr>
                       <a:r>
-                        <a:rPr lang="de-DE" sz="400">
+                        <a:rPr lang="de-DE" sz="400" dirty="0">
                           <a:effectLst/>
                         </a:rPr>
                         <a:t> </a:t>
                       </a:r>
-                      <a:endParaRPr lang="de-DE" sz="1400">
+                      <a:endParaRPr lang="de-DE" sz="1400" dirty="0">
                         <a:effectLst/>
                         <a:latin typeface="Calibri" panose="020F0502020204030204" pitchFamily="34" charset="0"/>
                         <a:ea typeface="DengXian"/>
@@ -6340,12 +6462,12 @@
                         </a:spcAft>
                       </a:pPr>
                       <a:r>
-                        <a:rPr lang="de-DE" sz="400">
+                        <a:rPr lang="de-DE" sz="400" dirty="0">
                           <a:effectLst/>
                         </a:rPr>
                         <a:t> </a:t>
                       </a:r>
-                      <a:endParaRPr lang="de-DE" sz="1400">
+                      <a:endParaRPr lang="de-DE" sz="1400" dirty="0">
                         <a:effectLst/>
                         <a:latin typeface="Calibri" panose="020F0502020204030204" pitchFamily="34" charset="0"/>
                         <a:ea typeface="DengXian"/>
@@ -6369,12 +6491,12 @@
                         </a:spcAft>
                       </a:pPr>
                       <a:r>
-                        <a:rPr lang="de-DE" sz="400">
+                        <a:rPr lang="de-DE" sz="400" dirty="0">
                           <a:effectLst/>
                         </a:rPr>
                         <a:t> </a:t>
                       </a:r>
-                      <a:endParaRPr lang="de-DE" sz="1400">
+                      <a:endParaRPr lang="de-DE" sz="1400" dirty="0">
                         <a:effectLst/>
                         <a:latin typeface="Calibri" panose="020F0502020204030204" pitchFamily="34" charset="0"/>
                         <a:ea typeface="DengXian"/>
@@ -6384,6 +6506,11 @@
                   </a:txBody>
                   <a:tcPr marL="68580" marR="68580" marT="0" marB="0"/>
                 </a:tc>
+                <a:extLst>
+                  <a:ext uri="{0D108BD9-81ED-4DB2-BD59-A6C34878D82A}">
+                    <a16:rowId xmlns:a16="http://schemas.microsoft.com/office/drawing/2014/main" val="10009"/>
+                  </a:ext>
+                </a:extLst>
               </a:tr>
               <a:tr h="368206">
                 <a:tc>
@@ -6400,12 +6527,12 @@
                         </a:spcAft>
                       </a:pPr>
                       <a:r>
-                        <a:rPr lang="de-DE" sz="1600">
+                        <a:rPr lang="de-DE" sz="1600" dirty="0">
                           <a:effectLst/>
                         </a:rPr>
                         <a:t>Gesamtzeit</a:t>
                       </a:r>
-                      <a:endParaRPr lang="de-DE" sz="1400">
+                      <a:endParaRPr lang="de-DE" sz="1400" dirty="0">
                         <a:effectLst/>
                         <a:latin typeface="Calibri" panose="020F0502020204030204" pitchFamily="34" charset="0"/>
                         <a:ea typeface="DengXian"/>
@@ -6429,12 +6556,12 @@
                         </a:spcAft>
                       </a:pPr>
                       <a:r>
-                        <a:rPr lang="de-DE" sz="1600">
+                        <a:rPr lang="de-DE" sz="1600" dirty="0">
                           <a:effectLst/>
                         </a:rPr>
                         <a:t>117</a:t>
                       </a:r>
-                      <a:endParaRPr lang="de-DE" sz="1400">
+                      <a:endParaRPr lang="de-DE" sz="1400" dirty="0">
                         <a:effectLst/>
                         <a:latin typeface="Calibri" panose="020F0502020204030204" pitchFamily="34" charset="0"/>
                         <a:ea typeface="DengXian"/>
@@ -6458,12 +6585,12 @@
                         </a:spcAft>
                       </a:pPr>
                       <a:r>
-                        <a:rPr lang="de-DE" sz="1600">
+                        <a:rPr lang="de-DE" sz="1600" dirty="0">
                           <a:effectLst/>
                         </a:rPr>
                         <a:t>Gesamtzeit</a:t>
                       </a:r>
-                      <a:endParaRPr lang="de-DE" sz="1400">
+                      <a:endParaRPr lang="de-DE" sz="1400" dirty="0">
                         <a:effectLst/>
                         <a:latin typeface="Calibri" panose="020F0502020204030204" pitchFamily="34" charset="0"/>
                         <a:ea typeface="DengXian"/>
@@ -6487,12 +6614,12 @@
                         </a:spcAft>
                       </a:pPr>
                       <a:r>
-                        <a:rPr lang="de-DE" sz="1600">
+                        <a:rPr lang="de-DE" sz="1600" dirty="0">
                           <a:effectLst/>
                         </a:rPr>
                         <a:t>73</a:t>
                       </a:r>
-                      <a:endParaRPr lang="de-DE" sz="1400">
+                      <a:endParaRPr lang="de-DE" sz="1400" dirty="0">
                         <a:effectLst/>
                         <a:latin typeface="Calibri" panose="020F0502020204030204" pitchFamily="34" charset="0"/>
                         <a:ea typeface="DengXian"/>
@@ -6516,12 +6643,12 @@
                         </a:spcAft>
                       </a:pPr>
                       <a:r>
-                        <a:rPr lang="de-DE" sz="1600">
+                        <a:rPr lang="de-DE" sz="1600" dirty="0">
                           <a:effectLst/>
                         </a:rPr>
                         <a:t>Gesamtzeit</a:t>
                       </a:r>
-                      <a:endParaRPr lang="de-DE" sz="1400">
+                      <a:endParaRPr lang="de-DE" sz="1400" dirty="0">
                         <a:effectLst/>
                         <a:latin typeface="Calibri" panose="020F0502020204030204" pitchFamily="34" charset="0"/>
                         <a:ea typeface="DengXian"/>
@@ -6560,6 +6687,11 @@
                   </a:txBody>
                   <a:tcPr marL="68580" marR="68580" marT="0" marB="0"/>
                 </a:tc>
+                <a:extLst>
+                  <a:ext uri="{0D108BD9-81ED-4DB2-BD59-A6C34878D82A}">
+                    <a16:rowId xmlns:a16="http://schemas.microsoft.com/office/drawing/2014/main" val="10010"/>
+                  </a:ext>
+                </a:extLst>
               </a:tr>
             </a:tbl>
           </a:graphicData>
@@ -6569,157 +6701,6 @@
     <p:extLst>
       <p:ext uri="{BB962C8B-B14F-4D97-AF65-F5344CB8AC3E}">
         <p14:creationId xmlns:p14="http://schemas.microsoft.com/office/powerpoint/2010/main" val="64725695"/>
-      </p:ext>
-    </p:extLst>
-  </p:cSld>
-  <p:clrMapOvr>
-    <a:masterClrMapping/>
-  </p:clrMapOvr>
-  <p:timing>
-    <p:tnLst>
-      <p:par>
-        <p:cTn id="1" dur="indefinite" restart="never" nodeType="tmRoot"/>
-      </p:par>
-    </p:tnLst>
-  </p:timing>
-</p:sld>
-</file>
-
-<file path=ppt/slides/slide7.xml><?xml version="1.0" encoding="utf-8"?>
-<p:sld xmlns:a="http://schemas.openxmlformats.org/drawingml/2006/main" xmlns:r="http://schemas.openxmlformats.org/officeDocument/2006/relationships" xmlns:p="http://schemas.openxmlformats.org/presentationml/2006/main">
-  <p:cSld>
-    <p:spTree>
-      <p:nvGrpSpPr>
-        <p:cNvPr id="1" name=""/>
-        <p:cNvGrpSpPr/>
-        <p:nvPr/>
-      </p:nvGrpSpPr>
-      <p:grpSpPr>
-        <a:xfrm>
-          <a:off x="0" y="0"/>
-          <a:ext cx="0" cy="0"/>
-          <a:chOff x="0" y="0"/>
-          <a:chExt cx="0" cy="0"/>
-        </a:xfrm>
-      </p:grpSpPr>
-      <p:sp>
-        <p:nvSpPr>
-          <p:cNvPr id="2" name="Titel 1"/>
-          <p:cNvSpPr>
-            <a:spLocks noGrp="1"/>
-          </p:cNvSpPr>
-          <p:nvPr>
-            <p:ph type="title"/>
-          </p:nvPr>
-        </p:nvSpPr>
-        <p:spPr/>
-        <p:txBody>
-          <a:bodyPr/>
-          <a:lstStyle/>
-          <a:p>
-            <a:r>
-              <a:rPr lang="de-DE" dirty="0" smtClean="0"/>
-              <a:t>Probleme</a:t>
-            </a:r>
-            <a:endParaRPr lang="de-DE" dirty="0"/>
-          </a:p>
-        </p:txBody>
-      </p:sp>
-      <p:sp>
-        <p:nvSpPr>
-          <p:cNvPr id="3" name="Inhaltsplatzhalter 2"/>
-          <p:cNvSpPr>
-            <a:spLocks noGrp="1"/>
-          </p:cNvSpPr>
-          <p:nvPr>
-            <p:ph idx="1"/>
-          </p:nvPr>
-        </p:nvSpPr>
-        <p:spPr/>
-        <p:txBody>
-          <a:bodyPr/>
-          <a:lstStyle/>
-          <a:p>
-            <a:pPr>
-              <a:buFont typeface="Arial" panose="020B0604020202020204" pitchFamily="34" charset="0"/>
-              <a:buChar char="•"/>
-            </a:pPr>
-            <a:r>
-              <a:rPr lang="de-DE" dirty="0" smtClean="0"/>
-              <a:t> Bugs</a:t>
-            </a:r>
-          </a:p>
-          <a:p>
-            <a:pPr lvl="1">
-              <a:buFont typeface="Arial" panose="020B0604020202020204" pitchFamily="34" charset="0"/>
-              <a:buChar char="•"/>
-            </a:pPr>
-            <a:r>
-              <a:rPr lang="de-DE" dirty="0" smtClean="0"/>
-              <a:t>Neue Funktionen haben häufig alte Funktionen behindert</a:t>
-            </a:r>
-          </a:p>
-          <a:p>
-            <a:pPr lvl="1">
-              <a:buFont typeface="Arial" panose="020B0604020202020204" pitchFamily="34" charset="0"/>
-              <a:buChar char="•"/>
-            </a:pPr>
-            <a:r>
-              <a:rPr lang="de-DE" dirty="0" smtClean="0"/>
-              <a:t>CPU Überlastung bei der zyklischen Abarbeitung des Programms</a:t>
-            </a:r>
-          </a:p>
-          <a:p>
-            <a:pPr lvl="1">
-              <a:buFont typeface="Arial" panose="020B0604020202020204" pitchFamily="34" charset="0"/>
-              <a:buChar char="•"/>
-            </a:pPr>
-            <a:r>
-              <a:rPr lang="de-DE" dirty="0" smtClean="0"/>
-              <a:t>Bildschirm Größen unterschiede</a:t>
-            </a:r>
-          </a:p>
-          <a:p>
-            <a:pPr lvl="1">
-              <a:buFont typeface="Arial" panose="020B0604020202020204" pitchFamily="34" charset="0"/>
-              <a:buChar char="•"/>
-            </a:pPr>
-            <a:r>
-              <a:rPr lang="de-DE" dirty="0" smtClean="0"/>
-              <a:t>Schul-PCs </a:t>
-            </a:r>
-            <a:r>
-              <a:rPr lang="de-DE" dirty="0"/>
-              <a:t>z</a:t>
-            </a:r>
-            <a:r>
-              <a:rPr lang="de-DE" dirty="0" smtClean="0"/>
-              <a:t>u langsam</a:t>
-            </a:r>
-          </a:p>
-          <a:p>
-            <a:pPr>
-              <a:buFont typeface="Arial" panose="020B0604020202020204" pitchFamily="34" charset="0"/>
-              <a:buChar char="•"/>
-            </a:pPr>
-            <a:r>
-              <a:rPr lang="de-DE" dirty="0" smtClean="0"/>
-              <a:t> Keine richtige Arbeitseinteilung</a:t>
-            </a:r>
-          </a:p>
-          <a:p>
-            <a:pPr lvl="1">
-              <a:buFont typeface="Arial" panose="020B0604020202020204" pitchFamily="34" charset="0"/>
-              <a:buChar char="•"/>
-            </a:pPr>
-            <a:endParaRPr lang="de-DE" dirty="0"/>
-          </a:p>
-        </p:txBody>
-      </p:sp>
-    </p:spTree>
-    <p:extLst>
-      <p:ext uri="{BB962C8B-B14F-4D97-AF65-F5344CB8AC3E}">
-        <p14:creationId xmlns:p14="http://schemas.microsoft.com/office/powerpoint/2010/main" val="348873555"/>
       </p:ext>
     </p:extLst>
   </p:cSld>
@@ -6762,10 +6743,9 @@
           <a:lstStyle/>
           <a:p>
             <a:r>
-              <a:rPr lang="de-DE" dirty="0" smtClean="0"/>
-              <a:t>Mögliche Problemlösungen</a:t>
-            </a:r>
-            <a:endParaRPr lang="de-DE" dirty="0"/>
+              <a:rPr lang="de-DE" dirty="0"/>
+              <a:t>Probleme</a:t>
+            </a:r>
           </a:p>
         </p:txBody>
       </p:sp>
@@ -6789,9 +6769,65 @@
               <a:buChar char="•"/>
             </a:pPr>
             <a:r>
-              <a:rPr lang="de-DE" dirty="0" smtClean="0"/>
-              <a:t> </a:t>
-            </a:r>
+              <a:rPr lang="de-DE" dirty="0"/>
+              <a:t> Bugs</a:t>
+            </a:r>
+          </a:p>
+          <a:p>
+            <a:pPr lvl="1">
+              <a:buFont typeface="Arial" panose="020B0604020202020204" pitchFamily="34" charset="0"/>
+              <a:buChar char="•"/>
+            </a:pPr>
+            <a:r>
+              <a:rPr lang="de-DE" dirty="0"/>
+              <a:t>Neue Funktionen haben häufig alte Funktionen behindert</a:t>
+            </a:r>
+          </a:p>
+          <a:p>
+            <a:pPr lvl="1">
+              <a:buFont typeface="Arial" panose="020B0604020202020204" pitchFamily="34" charset="0"/>
+              <a:buChar char="•"/>
+            </a:pPr>
+            <a:r>
+              <a:rPr lang="de-DE" dirty="0"/>
+              <a:t>CPU Überlastung bei der zyklischen Abarbeitung des Programms</a:t>
+            </a:r>
+          </a:p>
+          <a:p>
+            <a:pPr lvl="1">
+              <a:buFont typeface="Arial" panose="020B0604020202020204" pitchFamily="34" charset="0"/>
+              <a:buChar char="•"/>
+            </a:pPr>
+            <a:r>
+              <a:rPr lang="de-DE" dirty="0"/>
+              <a:t>Bildschirm Größen unterschiede</a:t>
+            </a:r>
+          </a:p>
+          <a:p>
+            <a:pPr lvl="1">
+              <a:buFont typeface="Arial" panose="020B0604020202020204" pitchFamily="34" charset="0"/>
+              <a:buChar char="•"/>
+            </a:pPr>
+            <a:r>
+              <a:rPr lang="de-DE" dirty="0"/>
+              <a:t>Schul-PCs zu langsam</a:t>
+            </a:r>
+          </a:p>
+          <a:p>
+            <a:pPr>
+              <a:buFont typeface="Arial" panose="020B0604020202020204" pitchFamily="34" charset="0"/>
+              <a:buChar char="•"/>
+            </a:pPr>
+            <a:r>
+              <a:rPr lang="de-DE" dirty="0"/>
+              <a:t> Keine richtige Arbeitseinteilung</a:t>
+            </a:r>
+          </a:p>
+          <a:p>
+            <a:pPr lvl="1">
+              <a:buFont typeface="Arial" panose="020B0604020202020204" pitchFamily="34" charset="0"/>
+              <a:buChar char="•"/>
+            </a:pPr>
             <a:endParaRPr lang="de-DE" dirty="0"/>
           </a:p>
         </p:txBody>
@@ -6799,7 +6835,7 @@
     </p:spTree>
     <p:extLst>
       <p:ext uri="{BB962C8B-B14F-4D97-AF65-F5344CB8AC3E}">
-        <p14:creationId xmlns:p14="http://schemas.microsoft.com/office/powerpoint/2010/main" val="4120888695"/>
+        <p14:creationId xmlns:p14="http://schemas.microsoft.com/office/powerpoint/2010/main" val="348873555"/>
       </p:ext>
     </p:extLst>
   </p:cSld>
@@ -6842,10 +6878,9 @@
           <a:lstStyle/>
           <a:p>
             <a:r>
-              <a:rPr lang="de-DE" dirty="0" smtClean="0"/>
-              <a:t>Fazit</a:t>
-            </a:r>
-            <a:endParaRPr lang="de-DE" dirty="0"/>
+              <a:rPr lang="de-DE" dirty="0"/>
+              <a:t>Mögliche Problemlösungen</a:t>
+            </a:r>
           </a:p>
         </p:txBody>
       </p:sp>
@@ -6869,17 +6904,16 @@
               <a:buChar char="•"/>
             </a:pPr>
             <a:r>
-              <a:rPr lang="de-DE" dirty="0" smtClean="0"/>
+              <a:rPr lang="de-DE" dirty="0"/>
               <a:t> </a:t>
             </a:r>
-            <a:endParaRPr lang="de-DE" dirty="0"/>
           </a:p>
         </p:txBody>
       </p:sp>
     </p:spTree>
     <p:extLst>
       <p:ext uri="{BB962C8B-B14F-4D97-AF65-F5344CB8AC3E}">
-        <p14:creationId xmlns:p14="http://schemas.microsoft.com/office/powerpoint/2010/main" val="505189340"/>
+        <p14:creationId xmlns:p14="http://schemas.microsoft.com/office/powerpoint/2010/main" val="4120888695"/>
       </p:ext>
     </p:extLst>
   </p:cSld>

</xml_diff>